<commit_message>
Add an additional indicator.
</commit_message>
<xml_diff>
--- a/paperfigures/results_of_optimal_grids/summary.pptx
+++ b/paperfigures/results_of_optimal_grids/summary.pptx
@@ -245,7 +245,7 @@
           <a:p>
             <a:fld id="{AC89DDD2-4715-4F5A-ACEC-C4307FEF7E68}" type="datetimeFigureOut">
               <a:rPr lang="en-US" smtClean="0"/>
-              <a:t>10/15/2024</a:t>
+              <a:t>10/21/2024</a:t>
             </a:fld>
             <a:endParaRPr lang="en-US"/>
           </a:p>
@@ -415,7 +415,7 @@
           <a:p>
             <a:fld id="{AC89DDD2-4715-4F5A-ACEC-C4307FEF7E68}" type="datetimeFigureOut">
               <a:rPr lang="en-US" smtClean="0"/>
-              <a:t>10/15/2024</a:t>
+              <a:t>10/21/2024</a:t>
             </a:fld>
             <a:endParaRPr lang="en-US"/>
           </a:p>
@@ -595,7 +595,7 @@
           <a:p>
             <a:fld id="{AC89DDD2-4715-4F5A-ACEC-C4307FEF7E68}" type="datetimeFigureOut">
               <a:rPr lang="en-US" smtClean="0"/>
-              <a:t>10/15/2024</a:t>
+              <a:t>10/21/2024</a:t>
             </a:fld>
             <a:endParaRPr lang="en-US"/>
           </a:p>
@@ -765,7 +765,7 @@
           <a:p>
             <a:fld id="{AC89DDD2-4715-4F5A-ACEC-C4307FEF7E68}" type="datetimeFigureOut">
               <a:rPr lang="en-US" smtClean="0"/>
-              <a:t>10/15/2024</a:t>
+              <a:t>10/21/2024</a:t>
             </a:fld>
             <a:endParaRPr lang="en-US"/>
           </a:p>
@@ -1011,7 +1011,7 @@
           <a:p>
             <a:fld id="{AC89DDD2-4715-4F5A-ACEC-C4307FEF7E68}" type="datetimeFigureOut">
               <a:rPr lang="en-US" smtClean="0"/>
-              <a:t>10/15/2024</a:t>
+              <a:t>10/21/2024</a:t>
             </a:fld>
             <a:endParaRPr lang="en-US"/>
           </a:p>
@@ -1243,7 +1243,7 @@
           <a:p>
             <a:fld id="{AC89DDD2-4715-4F5A-ACEC-C4307FEF7E68}" type="datetimeFigureOut">
               <a:rPr lang="en-US" smtClean="0"/>
-              <a:t>10/15/2024</a:t>
+              <a:t>10/21/2024</a:t>
             </a:fld>
             <a:endParaRPr lang="en-US"/>
           </a:p>
@@ -1610,7 +1610,7 @@
           <a:p>
             <a:fld id="{AC89DDD2-4715-4F5A-ACEC-C4307FEF7E68}" type="datetimeFigureOut">
               <a:rPr lang="en-US" smtClean="0"/>
-              <a:t>10/15/2024</a:t>
+              <a:t>10/21/2024</a:t>
             </a:fld>
             <a:endParaRPr lang="en-US"/>
           </a:p>
@@ -1728,7 +1728,7 @@
           <a:p>
             <a:fld id="{AC89DDD2-4715-4F5A-ACEC-C4307FEF7E68}" type="datetimeFigureOut">
               <a:rPr lang="en-US" smtClean="0"/>
-              <a:t>10/15/2024</a:t>
+              <a:t>10/21/2024</a:t>
             </a:fld>
             <a:endParaRPr lang="en-US"/>
           </a:p>
@@ -1823,7 +1823,7 @@
           <a:p>
             <a:fld id="{AC89DDD2-4715-4F5A-ACEC-C4307FEF7E68}" type="datetimeFigureOut">
               <a:rPr lang="en-US" smtClean="0"/>
-              <a:t>10/15/2024</a:t>
+              <a:t>10/21/2024</a:t>
             </a:fld>
             <a:endParaRPr lang="en-US"/>
           </a:p>
@@ -2100,7 +2100,7 @@
           <a:p>
             <a:fld id="{AC89DDD2-4715-4F5A-ACEC-C4307FEF7E68}" type="datetimeFigureOut">
               <a:rPr lang="en-US" smtClean="0"/>
-              <a:t>10/15/2024</a:t>
+              <a:t>10/21/2024</a:t>
             </a:fld>
             <a:endParaRPr lang="en-US"/>
           </a:p>
@@ -2357,7 +2357,7 @@
           <a:p>
             <a:fld id="{AC89DDD2-4715-4F5A-ACEC-C4307FEF7E68}" type="datetimeFigureOut">
               <a:rPr lang="en-US" smtClean="0"/>
-              <a:t>10/15/2024</a:t>
+              <a:t>10/21/2024</a:t>
             </a:fld>
             <a:endParaRPr lang="en-US"/>
           </a:p>
@@ -2570,7 +2570,7 @@
           <a:p>
             <a:fld id="{AC89DDD2-4715-4F5A-ACEC-C4307FEF7E68}" type="datetimeFigureOut">
               <a:rPr lang="en-US" smtClean="0"/>
-              <a:t>10/15/2024</a:t>
+              <a:t>10/21/2024</a:t>
             </a:fld>
             <a:endParaRPr lang="en-US"/>
           </a:p>
@@ -4558,7 +4558,7 @@
         </p:blipFill>
         <p:spPr>
           <a:xfrm>
-            <a:off x="6308168" y="3399488"/>
+            <a:off x="6308168" y="3391021"/>
             <a:ext cx="2743200" cy="2743200"/>
           </a:xfrm>
           <a:prstGeom prst="rect">
@@ -4597,7 +4597,7 @@
         </p:blipFill>
         <p:spPr>
           <a:xfrm>
-            <a:off x="792251" y="3399488"/>
+            <a:off x="792251" y="3391021"/>
             <a:ext cx="2743200" cy="2743200"/>
           </a:xfrm>
           <a:prstGeom prst="rect">
@@ -4636,7 +4636,7 @@
         </p:blipFill>
         <p:spPr>
           <a:xfrm>
-            <a:off x="3550614" y="3399488"/>
+            <a:off x="3550614" y="3391021"/>
             <a:ext cx="2743200" cy="2743200"/>
           </a:xfrm>
           <a:prstGeom prst="rect">
@@ -4801,7 +4801,7 @@
         </p:nvSpPr>
         <p:spPr>
           <a:xfrm>
-            <a:off x="792251" y="3399488"/>
+            <a:off x="792251" y="3391021"/>
             <a:ext cx="2743200" cy="228600"/>
           </a:xfrm>
           <a:prstGeom prst="rect">
@@ -4848,7 +4848,7 @@
         </p:nvSpPr>
         <p:spPr>
           <a:xfrm>
-            <a:off x="3550614" y="3399488"/>
+            <a:off x="3550614" y="3391021"/>
             <a:ext cx="2743200" cy="228600"/>
           </a:xfrm>
           <a:prstGeom prst="rect">
@@ -4895,7 +4895,7 @@
         </p:nvSpPr>
         <p:spPr>
           <a:xfrm>
-            <a:off x="6308168" y="3399488"/>
+            <a:off x="6308168" y="3391021"/>
             <a:ext cx="2743200" cy="228600"/>
           </a:xfrm>
           <a:prstGeom prst="rect">
@@ -4955,7 +4955,7 @@
         </p:blipFill>
         <p:spPr>
           <a:xfrm>
-            <a:off x="6308168" y="6160773"/>
+            <a:off x="6308168" y="6143839"/>
             <a:ext cx="2743200" cy="2743200"/>
           </a:xfrm>
           <a:prstGeom prst="rect">
@@ -4991,7 +4991,7 @@
         </p:blipFill>
         <p:spPr>
           <a:xfrm>
-            <a:off x="792251" y="6174503"/>
+            <a:off x="792251" y="6157569"/>
             <a:ext cx="2743200" cy="2743200"/>
           </a:xfrm>
           <a:prstGeom prst="rect">
@@ -5027,7 +5027,7 @@
         </p:blipFill>
         <p:spPr>
           <a:xfrm>
-            <a:off x="3535451" y="6160773"/>
+            <a:off x="3535451" y="6143839"/>
             <a:ext cx="2743200" cy="2743200"/>
           </a:xfrm>
           <a:prstGeom prst="rect">
@@ -5049,7 +5049,7 @@
         </p:nvSpPr>
         <p:spPr>
           <a:xfrm>
-            <a:off x="792251" y="6174503"/>
+            <a:off x="792251" y="6157569"/>
             <a:ext cx="2743200" cy="228600"/>
           </a:xfrm>
           <a:prstGeom prst="rect">
@@ -5096,7 +5096,7 @@
         </p:nvSpPr>
         <p:spPr>
           <a:xfrm>
-            <a:off x="3550614" y="6174503"/>
+            <a:off x="3550614" y="6157569"/>
             <a:ext cx="2743200" cy="228600"/>
           </a:xfrm>
           <a:prstGeom prst="rect">
@@ -5143,7 +5143,7 @@
         </p:nvSpPr>
         <p:spPr>
           <a:xfrm>
-            <a:off x="6308168" y="6174503"/>
+            <a:off x="6308168" y="6157569"/>
             <a:ext cx="2743200" cy="228600"/>
           </a:xfrm>
           <a:prstGeom prst="rect">
@@ -5203,7 +5203,7 @@
         </p:blipFill>
         <p:spPr>
           <a:xfrm>
-            <a:off x="6308168" y="8949518"/>
+            <a:off x="6308168" y="8924117"/>
             <a:ext cx="2743200" cy="2743200"/>
           </a:xfrm>
           <a:prstGeom prst="rect">
@@ -5239,7 +5239,7 @@
         </p:blipFill>
         <p:spPr>
           <a:xfrm>
-            <a:off x="807414" y="8949518"/>
+            <a:off x="807414" y="8924117"/>
             <a:ext cx="2743200" cy="2743200"/>
           </a:xfrm>
           <a:prstGeom prst="rect">
@@ -5275,7 +5275,7 @@
         </p:blipFill>
         <p:spPr>
           <a:xfrm>
-            <a:off x="3549805" y="8949518"/>
+            <a:off x="3549805" y="8924117"/>
             <a:ext cx="2743200" cy="2743200"/>
           </a:xfrm>
           <a:prstGeom prst="rect">
@@ -5297,7 +5297,7 @@
         </p:nvSpPr>
         <p:spPr>
           <a:xfrm>
-            <a:off x="792251" y="8944913"/>
+            <a:off x="792251" y="8919512"/>
             <a:ext cx="2743200" cy="228600"/>
           </a:xfrm>
           <a:prstGeom prst="rect">
@@ -5344,7 +5344,7 @@
         </p:nvSpPr>
         <p:spPr>
           <a:xfrm>
-            <a:off x="3550614" y="8944913"/>
+            <a:off x="3550614" y="8919512"/>
             <a:ext cx="2743200" cy="228600"/>
           </a:xfrm>
           <a:prstGeom prst="rect">
@@ -5391,7 +5391,7 @@
         </p:nvSpPr>
         <p:spPr>
           <a:xfrm>
-            <a:off x="6308168" y="8944913"/>
+            <a:off x="6308168" y="8919512"/>
             <a:ext cx="2743200" cy="228600"/>
           </a:xfrm>
           <a:prstGeom prst="rect">
@@ -5851,410 +5851,12 @@
           <a:chExt cx="0" cy="0"/>
         </a:xfrm>
       </p:grpSpPr>
-      <p:sp>
-        <p:nvSpPr>
-          <p:cNvPr id="16" name="Rectangle 15">
+      <p:grpSp>
+        <p:nvGrpSpPr>
+          <p:cNvPr id="64" name="Group 63">
             <a:extLst>
               <a:ext uri="{FF2B5EF4-FFF2-40B4-BE49-F238E27FC236}">
-                <a16:creationId xmlns:a16="http://schemas.microsoft.com/office/drawing/2014/main" id="{31BA3833-CC4E-F0FB-AFD5-B0A7BB938E65}"/>
-              </a:ext>
-            </a:extLst>
-          </p:cNvPr>
-          <p:cNvSpPr/>
-          <p:nvPr/>
-        </p:nvSpPr>
-        <p:spPr>
-          <a:xfrm>
-            <a:off x="3893335" y="7723445"/>
-            <a:ext cx="68207" cy="5078155"/>
-          </a:xfrm>
-          <a:prstGeom prst="rect">
-            <a:avLst/>
-          </a:prstGeom>
-          <a:noFill/>
-          <a:ln>
-            <a:noFill/>
-          </a:ln>
-        </p:spPr>
-        <p:style>
-          <a:lnRef idx="2">
-            <a:schemeClr val="accent1">
-              <a:shade val="15000"/>
-            </a:schemeClr>
-          </a:lnRef>
-          <a:fillRef idx="1">
-            <a:schemeClr val="accent1"/>
-          </a:fillRef>
-          <a:effectRef idx="0">
-            <a:schemeClr val="accent1"/>
-          </a:effectRef>
-          <a:fontRef idx="minor">
-            <a:schemeClr val="lt1"/>
-          </a:fontRef>
-        </p:style>
-        <p:txBody>
-          <a:bodyPr rtlCol="0" anchor="t"/>
-          <a:lstStyle/>
-          <a:p>
-            <a:pPr algn="ctr"/>
-            <a:r>
-              <a:rPr lang="en-US" sz="900" b="1" dirty="0">
-                <a:solidFill>
-                  <a:schemeClr val="tx1"/>
-                </a:solidFill>
-                <a:latin typeface="Times New Roman" panose="02020603050405020304" pitchFamily="18" charset="0"/>
-                <a:cs typeface="Times New Roman" panose="02020603050405020304" pitchFamily="18" charset="0"/>
-              </a:rPr>
-              <a:t>1</a:t>
-            </a:r>
-          </a:p>
-          <a:p>
-            <a:pPr algn="ctr"/>
-            <a:endParaRPr lang="en-US" sz="900" b="1" dirty="0">
-              <a:solidFill>
-                <a:schemeClr val="tx1"/>
-              </a:solidFill>
-              <a:latin typeface="Times New Roman" panose="02020603050405020304" pitchFamily="18" charset="0"/>
-              <a:cs typeface="Times New Roman" panose="02020603050405020304" pitchFamily="18" charset="0"/>
-            </a:endParaRPr>
-          </a:p>
-          <a:p>
-            <a:pPr algn="ctr"/>
-            <a:endParaRPr lang="en-US" sz="900" b="1" dirty="0">
-              <a:solidFill>
-                <a:schemeClr val="tx1"/>
-              </a:solidFill>
-              <a:latin typeface="Times New Roman" panose="02020603050405020304" pitchFamily="18" charset="0"/>
-              <a:cs typeface="Times New Roman" panose="02020603050405020304" pitchFamily="18" charset="0"/>
-            </a:endParaRPr>
-          </a:p>
-          <a:p>
-            <a:pPr algn="ctr"/>
-            <a:endParaRPr lang="en-US" sz="900" b="1" dirty="0">
-              <a:solidFill>
-                <a:schemeClr val="tx1"/>
-              </a:solidFill>
-              <a:latin typeface="Times New Roman" panose="02020603050405020304" pitchFamily="18" charset="0"/>
-              <a:cs typeface="Times New Roman" panose="02020603050405020304" pitchFamily="18" charset="0"/>
-            </a:endParaRPr>
-          </a:p>
-          <a:p>
-            <a:pPr algn="ctr"/>
-            <a:endParaRPr lang="en-US" sz="900" b="1" dirty="0">
-              <a:solidFill>
-                <a:schemeClr val="tx1"/>
-              </a:solidFill>
-              <a:latin typeface="Times New Roman" panose="02020603050405020304" pitchFamily="18" charset="0"/>
-              <a:cs typeface="Times New Roman" panose="02020603050405020304" pitchFamily="18" charset="0"/>
-            </a:endParaRPr>
-          </a:p>
-          <a:p>
-            <a:pPr algn="ctr"/>
-            <a:endParaRPr lang="en-US" sz="900" b="1" dirty="0">
-              <a:solidFill>
-                <a:schemeClr val="tx1"/>
-              </a:solidFill>
-              <a:latin typeface="Times New Roman" panose="02020603050405020304" pitchFamily="18" charset="0"/>
-              <a:cs typeface="Times New Roman" panose="02020603050405020304" pitchFamily="18" charset="0"/>
-            </a:endParaRPr>
-          </a:p>
-          <a:p>
-            <a:pPr algn="ctr"/>
-            <a:endParaRPr lang="en-US" sz="900" b="1" dirty="0">
-              <a:solidFill>
-                <a:schemeClr val="tx1"/>
-              </a:solidFill>
-              <a:latin typeface="Times New Roman" panose="02020603050405020304" pitchFamily="18" charset="0"/>
-              <a:cs typeface="Times New Roman" panose="02020603050405020304" pitchFamily="18" charset="0"/>
-            </a:endParaRPr>
-          </a:p>
-          <a:p>
-            <a:pPr algn="ctr"/>
-            <a:endParaRPr lang="en-US" sz="900" b="1" dirty="0">
-              <a:solidFill>
-                <a:schemeClr val="tx1"/>
-              </a:solidFill>
-              <a:latin typeface="Times New Roman" panose="02020603050405020304" pitchFamily="18" charset="0"/>
-              <a:cs typeface="Times New Roman" panose="02020603050405020304" pitchFamily="18" charset="0"/>
-            </a:endParaRPr>
-          </a:p>
-          <a:p>
-            <a:pPr algn="ctr"/>
-            <a:endParaRPr lang="en-US" sz="900" b="1" dirty="0">
-              <a:solidFill>
-                <a:schemeClr val="tx1"/>
-              </a:solidFill>
-              <a:latin typeface="Times New Roman" panose="02020603050405020304" pitchFamily="18" charset="0"/>
-              <a:cs typeface="Times New Roman" panose="02020603050405020304" pitchFamily="18" charset="0"/>
-            </a:endParaRPr>
-          </a:p>
-          <a:p>
-            <a:pPr algn="ctr"/>
-            <a:endParaRPr lang="en-US" sz="900" b="1" dirty="0">
-              <a:solidFill>
-                <a:schemeClr val="tx1"/>
-              </a:solidFill>
-              <a:latin typeface="Times New Roman" panose="02020603050405020304" pitchFamily="18" charset="0"/>
-              <a:cs typeface="Times New Roman" panose="02020603050405020304" pitchFamily="18" charset="0"/>
-            </a:endParaRPr>
-          </a:p>
-          <a:p>
-            <a:pPr algn="ctr"/>
-            <a:endParaRPr lang="en-US" sz="900" b="1" dirty="0">
-              <a:solidFill>
-                <a:schemeClr val="tx1"/>
-              </a:solidFill>
-              <a:latin typeface="Times New Roman" panose="02020603050405020304" pitchFamily="18" charset="0"/>
-              <a:cs typeface="Times New Roman" panose="02020603050405020304" pitchFamily="18" charset="0"/>
-            </a:endParaRPr>
-          </a:p>
-          <a:p>
-            <a:pPr algn="ctr"/>
-            <a:r>
-              <a:rPr lang="en-US" sz="900" b="1" dirty="0">
-                <a:solidFill>
-                  <a:schemeClr val="tx1"/>
-                </a:solidFill>
-                <a:latin typeface="Times New Roman" panose="02020603050405020304" pitchFamily="18" charset="0"/>
-                <a:cs typeface="Times New Roman" panose="02020603050405020304" pitchFamily="18" charset="0"/>
-              </a:rPr>
-              <a:t>2</a:t>
-            </a:r>
-          </a:p>
-          <a:p>
-            <a:pPr algn="ctr"/>
-            <a:endParaRPr lang="en-US" sz="900" b="1" dirty="0">
-              <a:solidFill>
-                <a:schemeClr val="tx1"/>
-              </a:solidFill>
-              <a:latin typeface="Times New Roman" panose="02020603050405020304" pitchFamily="18" charset="0"/>
-              <a:cs typeface="Times New Roman" panose="02020603050405020304" pitchFamily="18" charset="0"/>
-            </a:endParaRPr>
-          </a:p>
-          <a:p>
-            <a:pPr algn="ctr"/>
-            <a:endParaRPr lang="en-US" sz="900" b="1" dirty="0">
-              <a:solidFill>
-                <a:schemeClr val="tx1"/>
-              </a:solidFill>
-              <a:latin typeface="Times New Roman" panose="02020603050405020304" pitchFamily="18" charset="0"/>
-              <a:cs typeface="Times New Roman" panose="02020603050405020304" pitchFamily="18" charset="0"/>
-            </a:endParaRPr>
-          </a:p>
-          <a:p>
-            <a:pPr algn="ctr"/>
-            <a:endParaRPr lang="en-US" sz="900" b="1" dirty="0">
-              <a:solidFill>
-                <a:schemeClr val="tx1"/>
-              </a:solidFill>
-              <a:latin typeface="Times New Roman" panose="02020603050405020304" pitchFamily="18" charset="0"/>
-              <a:cs typeface="Times New Roman" panose="02020603050405020304" pitchFamily="18" charset="0"/>
-            </a:endParaRPr>
-          </a:p>
-          <a:p>
-            <a:pPr algn="ctr"/>
-            <a:endParaRPr lang="en-US" sz="900" b="1" dirty="0">
-              <a:solidFill>
-                <a:schemeClr val="tx1"/>
-              </a:solidFill>
-              <a:latin typeface="Times New Roman" panose="02020603050405020304" pitchFamily="18" charset="0"/>
-              <a:cs typeface="Times New Roman" panose="02020603050405020304" pitchFamily="18" charset="0"/>
-            </a:endParaRPr>
-          </a:p>
-          <a:p>
-            <a:pPr algn="ctr"/>
-            <a:endParaRPr lang="en-US" sz="900" b="1" dirty="0">
-              <a:solidFill>
-                <a:schemeClr val="tx1"/>
-              </a:solidFill>
-              <a:latin typeface="Times New Roman" panose="02020603050405020304" pitchFamily="18" charset="0"/>
-              <a:cs typeface="Times New Roman" panose="02020603050405020304" pitchFamily="18" charset="0"/>
-            </a:endParaRPr>
-          </a:p>
-          <a:p>
-            <a:pPr algn="ctr"/>
-            <a:endParaRPr lang="en-US" sz="900" b="1" dirty="0">
-              <a:solidFill>
-                <a:schemeClr val="tx1"/>
-              </a:solidFill>
-              <a:latin typeface="Times New Roman" panose="02020603050405020304" pitchFamily="18" charset="0"/>
-              <a:cs typeface="Times New Roman" panose="02020603050405020304" pitchFamily="18" charset="0"/>
-            </a:endParaRPr>
-          </a:p>
-          <a:p>
-            <a:pPr algn="ctr"/>
-            <a:endParaRPr lang="en-US" sz="900" b="1" dirty="0">
-              <a:solidFill>
-                <a:schemeClr val="tx1"/>
-              </a:solidFill>
-              <a:latin typeface="Times New Roman" panose="02020603050405020304" pitchFamily="18" charset="0"/>
-              <a:cs typeface="Times New Roman" panose="02020603050405020304" pitchFamily="18" charset="0"/>
-            </a:endParaRPr>
-          </a:p>
-          <a:p>
-            <a:pPr algn="ctr"/>
-            <a:endParaRPr lang="en-US" sz="900" b="1" dirty="0">
-              <a:solidFill>
-                <a:schemeClr val="tx1"/>
-              </a:solidFill>
-              <a:latin typeface="Times New Roman" panose="02020603050405020304" pitchFamily="18" charset="0"/>
-              <a:cs typeface="Times New Roman" panose="02020603050405020304" pitchFamily="18" charset="0"/>
-            </a:endParaRPr>
-          </a:p>
-          <a:p>
-            <a:pPr algn="ctr"/>
-            <a:endParaRPr lang="en-US" sz="900" b="1" dirty="0">
-              <a:solidFill>
-                <a:schemeClr val="tx1"/>
-              </a:solidFill>
-              <a:latin typeface="Times New Roman" panose="02020603050405020304" pitchFamily="18" charset="0"/>
-              <a:cs typeface="Times New Roman" panose="02020603050405020304" pitchFamily="18" charset="0"/>
-            </a:endParaRPr>
-          </a:p>
-          <a:p>
-            <a:pPr algn="ctr"/>
-            <a:endParaRPr lang="en-US" sz="900" b="1" dirty="0">
-              <a:solidFill>
-                <a:schemeClr val="tx1"/>
-              </a:solidFill>
-              <a:latin typeface="Times New Roman" panose="02020603050405020304" pitchFamily="18" charset="0"/>
-              <a:cs typeface="Times New Roman" panose="02020603050405020304" pitchFamily="18" charset="0"/>
-            </a:endParaRPr>
-          </a:p>
-          <a:p>
-            <a:pPr algn="ctr"/>
-            <a:r>
-              <a:rPr lang="en-US" sz="900" b="1" dirty="0">
-                <a:solidFill>
-                  <a:schemeClr val="tx1"/>
-                </a:solidFill>
-                <a:latin typeface="Times New Roman" panose="02020603050405020304" pitchFamily="18" charset="0"/>
-                <a:cs typeface="Times New Roman" panose="02020603050405020304" pitchFamily="18" charset="0"/>
-              </a:rPr>
-              <a:t>3</a:t>
-            </a:r>
-          </a:p>
-          <a:p>
-            <a:pPr algn="ctr"/>
-            <a:endParaRPr lang="en-US" sz="900" b="1" dirty="0">
-              <a:solidFill>
-                <a:schemeClr val="tx1"/>
-              </a:solidFill>
-              <a:latin typeface="Times New Roman" panose="02020603050405020304" pitchFamily="18" charset="0"/>
-              <a:cs typeface="Times New Roman" panose="02020603050405020304" pitchFamily="18" charset="0"/>
-            </a:endParaRPr>
-          </a:p>
-          <a:p>
-            <a:pPr algn="ctr"/>
-            <a:endParaRPr lang="en-US" sz="900" b="1" dirty="0">
-              <a:solidFill>
-                <a:schemeClr val="tx1"/>
-              </a:solidFill>
-              <a:latin typeface="Times New Roman" panose="02020603050405020304" pitchFamily="18" charset="0"/>
-              <a:cs typeface="Times New Roman" panose="02020603050405020304" pitchFamily="18" charset="0"/>
-            </a:endParaRPr>
-          </a:p>
-          <a:p>
-            <a:pPr algn="ctr"/>
-            <a:endParaRPr lang="en-US" sz="900" b="1" dirty="0">
-              <a:solidFill>
-                <a:schemeClr val="tx1"/>
-              </a:solidFill>
-              <a:latin typeface="Times New Roman" panose="02020603050405020304" pitchFamily="18" charset="0"/>
-              <a:cs typeface="Times New Roman" panose="02020603050405020304" pitchFamily="18" charset="0"/>
-            </a:endParaRPr>
-          </a:p>
-          <a:p>
-            <a:pPr algn="ctr"/>
-            <a:endParaRPr lang="en-US" sz="900" b="1" dirty="0">
-              <a:solidFill>
-                <a:schemeClr val="tx1"/>
-              </a:solidFill>
-              <a:latin typeface="Times New Roman" panose="02020603050405020304" pitchFamily="18" charset="0"/>
-              <a:cs typeface="Times New Roman" panose="02020603050405020304" pitchFamily="18" charset="0"/>
-            </a:endParaRPr>
-          </a:p>
-          <a:p>
-            <a:pPr algn="ctr"/>
-            <a:endParaRPr lang="en-US" sz="900" b="1" dirty="0">
-              <a:solidFill>
-                <a:schemeClr val="tx1"/>
-              </a:solidFill>
-              <a:latin typeface="Times New Roman" panose="02020603050405020304" pitchFamily="18" charset="0"/>
-              <a:cs typeface="Times New Roman" panose="02020603050405020304" pitchFamily="18" charset="0"/>
-            </a:endParaRPr>
-          </a:p>
-          <a:p>
-            <a:pPr algn="ctr"/>
-            <a:endParaRPr lang="en-US" sz="900" b="1" dirty="0">
-              <a:solidFill>
-                <a:schemeClr val="tx1"/>
-              </a:solidFill>
-              <a:latin typeface="Times New Roman" panose="02020603050405020304" pitchFamily="18" charset="0"/>
-              <a:cs typeface="Times New Roman" panose="02020603050405020304" pitchFamily="18" charset="0"/>
-            </a:endParaRPr>
-          </a:p>
-          <a:p>
-            <a:pPr algn="ctr"/>
-            <a:endParaRPr lang="en-US" sz="900" b="1" dirty="0">
-              <a:solidFill>
-                <a:schemeClr val="tx1"/>
-              </a:solidFill>
-              <a:latin typeface="Times New Roman" panose="02020603050405020304" pitchFamily="18" charset="0"/>
-              <a:cs typeface="Times New Roman" panose="02020603050405020304" pitchFamily="18" charset="0"/>
-            </a:endParaRPr>
-          </a:p>
-          <a:p>
-            <a:pPr algn="ctr"/>
-            <a:endParaRPr lang="en-US" sz="900" b="1" dirty="0">
-              <a:solidFill>
-                <a:schemeClr val="tx1"/>
-              </a:solidFill>
-              <a:latin typeface="Times New Roman" panose="02020603050405020304" pitchFamily="18" charset="0"/>
-              <a:cs typeface="Times New Roman" panose="02020603050405020304" pitchFamily="18" charset="0"/>
-            </a:endParaRPr>
-          </a:p>
-          <a:p>
-            <a:pPr algn="ctr"/>
-            <a:endParaRPr lang="en-US" sz="900" b="1" dirty="0">
-              <a:solidFill>
-                <a:schemeClr val="tx1"/>
-              </a:solidFill>
-              <a:latin typeface="Times New Roman" panose="02020603050405020304" pitchFamily="18" charset="0"/>
-              <a:cs typeface="Times New Roman" panose="02020603050405020304" pitchFamily="18" charset="0"/>
-            </a:endParaRPr>
-          </a:p>
-          <a:p>
-            <a:pPr algn="ctr"/>
-            <a:endParaRPr lang="en-US" sz="900" b="1" dirty="0">
-              <a:solidFill>
-                <a:schemeClr val="tx1"/>
-              </a:solidFill>
-              <a:latin typeface="Times New Roman" panose="02020603050405020304" pitchFamily="18" charset="0"/>
-              <a:cs typeface="Times New Roman" panose="02020603050405020304" pitchFamily="18" charset="0"/>
-            </a:endParaRPr>
-          </a:p>
-          <a:p>
-            <a:pPr algn="ctr"/>
-            <a:r>
-              <a:rPr lang="en-US" sz="900" b="1" dirty="0">
-                <a:solidFill>
-                  <a:schemeClr val="tx1"/>
-                </a:solidFill>
-                <a:latin typeface="Times New Roman" panose="02020603050405020304" pitchFamily="18" charset="0"/>
-                <a:cs typeface="Times New Roman" panose="02020603050405020304" pitchFamily="18" charset="0"/>
-              </a:rPr>
-              <a:t>4</a:t>
-            </a:r>
-          </a:p>
-        </p:txBody>
-      </p:sp>
-      <p:grpSp>
-        <p:nvGrpSpPr>
-          <p:cNvPr id="59" name="Group 58">
-            <a:extLst>
-              <a:ext uri="{FF2B5EF4-FFF2-40B4-BE49-F238E27FC236}">
-                <a16:creationId xmlns:a16="http://schemas.microsoft.com/office/drawing/2014/main" id="{5451E49E-8065-5B32-60B2-87AB0A8081E7}"/>
+                <a16:creationId xmlns:a16="http://schemas.microsoft.com/office/drawing/2014/main" id="{4EB50675-DA27-F734-7CD7-AAA133EBAF77}"/>
               </a:ext>
             </a:extLst>
           </p:cNvPr>
@@ -6263,10 +5865,10 @@
         </p:nvGrpSpPr>
         <p:grpSpPr>
           <a:xfrm>
-            <a:off x="0" y="0"/>
-            <a:ext cx="5006309" cy="6660074"/>
-            <a:chOff x="0" y="0"/>
-            <a:chExt cx="5006309" cy="6660074"/>
+            <a:off x="211756" y="1366106"/>
+            <a:ext cx="9291658" cy="1523480"/>
+            <a:chOff x="211756" y="211074"/>
+            <a:chExt cx="9291658" cy="1523480"/>
           </a:xfrm>
         </p:grpSpPr>
         <p:pic>
@@ -6297,8 +5899,8 @@
           </p:blipFill>
           <p:spPr>
             <a:xfrm>
-              <a:off x="1671997" y="0"/>
-              <a:ext cx="1662806" cy="1662806"/>
+              <a:off x="1743657" y="211074"/>
+              <a:ext cx="1523480" cy="1523480"/>
             </a:xfrm>
             <a:prstGeom prst="rect">
               <a:avLst/>
@@ -6336,8 +5938,8 @@
           </p:blipFill>
           <p:spPr>
             <a:xfrm>
-              <a:off x="0" y="0"/>
-              <a:ext cx="1662806" cy="1662806"/>
+              <a:off x="211756" y="211074"/>
+              <a:ext cx="1523480" cy="1523480"/>
             </a:xfrm>
             <a:prstGeom prst="rect">
               <a:avLst/>
@@ -6375,8 +5977,8 @@
           </p:blipFill>
           <p:spPr>
             <a:xfrm>
-              <a:off x="3343503" y="0"/>
-              <a:ext cx="1662806" cy="1662806"/>
+              <a:off x="3275107" y="211074"/>
+              <a:ext cx="1523480" cy="1523480"/>
             </a:xfrm>
             <a:prstGeom prst="rect">
               <a:avLst/>
@@ -6388,10 +5990,10 @@
         </p:pic>
         <p:pic>
           <p:nvPicPr>
-            <p:cNvPr id="7" name="Picture 6" descr="A diagram of a tower&#10;&#10;Description automatically generated">
+            <p:cNvPr id="31" name="Picture 30">
               <a:extLst>
                 <a:ext uri="{FF2B5EF4-FFF2-40B4-BE49-F238E27FC236}">
-                  <a16:creationId xmlns:a16="http://schemas.microsoft.com/office/drawing/2014/main" id="{55C93779-553D-39F3-272A-1EE8EA0C95E5}"/>
+                  <a16:creationId xmlns:a16="http://schemas.microsoft.com/office/drawing/2014/main" id="{B6A08E42-87B5-1959-D3D7-397CB7D75041}"/>
                 </a:ext>
               </a:extLst>
             </p:cNvPr>
@@ -6414,8 +6016,146 @@
           </p:blipFill>
           <p:spPr>
             <a:xfrm>
-              <a:off x="3343503" y="1667231"/>
-              <a:ext cx="1662806" cy="1662806"/>
+              <a:off x="6448484" y="211075"/>
+              <a:ext cx="1523480" cy="1523479"/>
+            </a:xfrm>
+            <a:prstGeom prst="rect">
+              <a:avLst/>
+            </a:prstGeom>
+            <a:ln>
+              <a:noFill/>
+            </a:ln>
+          </p:spPr>
+        </p:pic>
+        <p:pic>
+          <p:nvPicPr>
+            <p:cNvPr id="32" name="Picture 31" descr="A graph of a line graph&#10;&#10;Description automatically generated">
+              <a:extLst>
+                <a:ext uri="{FF2B5EF4-FFF2-40B4-BE49-F238E27FC236}">
+                  <a16:creationId xmlns:a16="http://schemas.microsoft.com/office/drawing/2014/main" id="{15B83C38-A45D-BEE9-2C70-8AF054B0711F}"/>
+                </a:ext>
+              </a:extLst>
+            </p:cNvPr>
+            <p:cNvPicPr>
+              <a:picLocks noChangeAspect="1"/>
+            </p:cNvPicPr>
+            <p:nvPr/>
+          </p:nvPicPr>
+          <p:blipFill>
+            <a:blip r:embed="rId6">
+              <a:extLst>
+                <a:ext uri="{28A0092B-C50C-407E-A947-70E740481C1C}">
+                  <a14:useLocalDpi xmlns:a14="http://schemas.microsoft.com/office/drawing/2010/main" val="0"/>
+                </a:ext>
+              </a:extLst>
+            </a:blip>
+            <a:stretch>
+              <a:fillRect/>
+            </a:stretch>
+          </p:blipFill>
+          <p:spPr>
+            <a:xfrm>
+              <a:off x="4916583" y="211075"/>
+              <a:ext cx="1523480" cy="1523479"/>
+            </a:xfrm>
+            <a:prstGeom prst="rect">
+              <a:avLst/>
+            </a:prstGeom>
+            <a:ln>
+              <a:noFill/>
+            </a:ln>
+          </p:spPr>
+        </p:pic>
+        <p:pic>
+          <p:nvPicPr>
+            <p:cNvPr id="33" name="Picture 32" descr="A graph of a line graph&#10;&#10;Description automatically generated with medium confidence">
+              <a:extLst>
+                <a:ext uri="{FF2B5EF4-FFF2-40B4-BE49-F238E27FC236}">
+                  <a16:creationId xmlns:a16="http://schemas.microsoft.com/office/drawing/2014/main" id="{11741553-C5EF-742B-3EF3-269D6ABF2364}"/>
+                </a:ext>
+              </a:extLst>
+            </p:cNvPr>
+            <p:cNvPicPr>
+              <a:picLocks noChangeAspect="1"/>
+            </p:cNvPicPr>
+            <p:nvPr/>
+          </p:nvPicPr>
+          <p:blipFill>
+            <a:blip r:embed="rId7">
+              <a:extLst>
+                <a:ext uri="{28A0092B-C50C-407E-A947-70E740481C1C}">
+                  <a14:useLocalDpi xmlns:a14="http://schemas.microsoft.com/office/drawing/2010/main" val="0"/>
+                </a:ext>
+              </a:extLst>
+            </a:blip>
+            <a:stretch>
+              <a:fillRect/>
+            </a:stretch>
+          </p:blipFill>
+          <p:spPr>
+            <a:xfrm>
+              <a:off x="7979934" y="211075"/>
+              <a:ext cx="1523480" cy="1523479"/>
+            </a:xfrm>
+            <a:prstGeom prst="rect">
+              <a:avLst/>
+            </a:prstGeom>
+            <a:ln>
+              <a:noFill/>
+            </a:ln>
+          </p:spPr>
+        </p:pic>
+      </p:grpSp>
+      <p:grpSp>
+        <p:nvGrpSpPr>
+          <p:cNvPr id="63" name="Group 62">
+            <a:extLst>
+              <a:ext uri="{FF2B5EF4-FFF2-40B4-BE49-F238E27FC236}">
+                <a16:creationId xmlns:a16="http://schemas.microsoft.com/office/drawing/2014/main" id="{36D9D6D1-B275-F1CD-CC7C-37B9F6FAC398}"/>
+              </a:ext>
+            </a:extLst>
+          </p:cNvPr>
+          <p:cNvGrpSpPr/>
+          <p:nvPr/>
+        </p:nvGrpSpPr>
+        <p:grpSpPr>
+          <a:xfrm>
+            <a:off x="211756" y="2895425"/>
+            <a:ext cx="9291658" cy="1523480"/>
+            <a:chOff x="211756" y="1740393"/>
+            <a:chExt cx="9291658" cy="1523480"/>
+          </a:xfrm>
+        </p:grpSpPr>
+        <p:pic>
+          <p:nvPicPr>
+            <p:cNvPr id="7" name="Picture 6" descr="A diagram of a tower&#10;&#10;Description automatically generated">
+              <a:extLst>
+                <a:ext uri="{FF2B5EF4-FFF2-40B4-BE49-F238E27FC236}">
+                  <a16:creationId xmlns:a16="http://schemas.microsoft.com/office/drawing/2014/main" id="{55C93779-553D-39F3-272A-1EE8EA0C95E5}"/>
+                </a:ext>
+              </a:extLst>
+            </p:cNvPr>
+            <p:cNvPicPr>
+              <a:picLocks noChangeAspect="1"/>
+            </p:cNvPicPr>
+            <p:nvPr/>
+          </p:nvPicPr>
+          <p:blipFill>
+            <a:blip r:embed="rId8">
+              <a:extLst>
+                <a:ext uri="{28A0092B-C50C-407E-A947-70E740481C1C}">
+                  <a14:useLocalDpi xmlns:a14="http://schemas.microsoft.com/office/drawing/2010/main" val="0"/>
+                </a:ext>
+              </a:extLst>
+            </a:blip>
+            <a:stretch>
+              <a:fillRect/>
+            </a:stretch>
+          </p:blipFill>
+          <p:spPr>
+            <a:xfrm>
+              <a:off x="3275107" y="1740393"/>
+              <a:ext cx="1523480" cy="1523480"/>
             </a:xfrm>
             <a:prstGeom prst="rect">
               <a:avLst/>
@@ -6440,7 +6180,7 @@
             <p:nvPr/>
           </p:nvPicPr>
           <p:blipFill>
-            <a:blip r:embed="rId6">
+            <a:blip r:embed="rId9">
               <a:extLst>
                 <a:ext uri="{28A0092B-C50C-407E-A947-70E740481C1C}">
                   <a14:useLocalDpi xmlns:a14="http://schemas.microsoft.com/office/drawing/2010/main" val="0"/>
@@ -6453,8 +6193,8 @@
           </p:blipFill>
           <p:spPr>
             <a:xfrm>
-              <a:off x="0" y="1667231"/>
-              <a:ext cx="1662806" cy="1662806"/>
+              <a:off x="211756" y="1740393"/>
+              <a:ext cx="1523480" cy="1523480"/>
             </a:xfrm>
             <a:prstGeom prst="rect">
               <a:avLst/>
@@ -6479,7 +6219,7 @@
             <p:nvPr/>
           </p:nvPicPr>
           <p:blipFill>
-            <a:blip r:embed="rId7">
+            <a:blip r:embed="rId10">
               <a:extLst>
                 <a:ext uri="{28A0092B-C50C-407E-A947-70E740481C1C}">
                   <a14:useLocalDpi xmlns:a14="http://schemas.microsoft.com/office/drawing/2010/main" val="0"/>
@@ -6492,8 +6232,8 @@
           </p:blipFill>
           <p:spPr>
             <a:xfrm>
-              <a:off x="1671997" y="1667231"/>
-              <a:ext cx="1662806" cy="1662806"/>
+              <a:off x="1743657" y="1740393"/>
+              <a:ext cx="1523480" cy="1523480"/>
             </a:xfrm>
             <a:prstGeom prst="rect">
               <a:avLst/>
@@ -6503,6 +6243,144 @@
             </a:ln>
           </p:spPr>
         </p:pic>
+        <p:pic>
+          <p:nvPicPr>
+            <p:cNvPr id="34" name="Picture 33" descr="A diagram of a building&#10;&#10;Description automatically generated">
+              <a:extLst>
+                <a:ext uri="{FF2B5EF4-FFF2-40B4-BE49-F238E27FC236}">
+                  <a16:creationId xmlns:a16="http://schemas.microsoft.com/office/drawing/2014/main" id="{36D6C0F1-9D85-5B89-B0B4-8012EACA235F}"/>
+                </a:ext>
+              </a:extLst>
+            </p:cNvPr>
+            <p:cNvPicPr>
+              <a:picLocks noChangeAspect="1"/>
+            </p:cNvPicPr>
+            <p:nvPr/>
+          </p:nvPicPr>
+          <p:blipFill>
+            <a:blip r:embed="rId11">
+              <a:extLst>
+                <a:ext uri="{28A0092B-C50C-407E-A947-70E740481C1C}">
+                  <a14:useLocalDpi xmlns:a14="http://schemas.microsoft.com/office/drawing/2010/main" val="0"/>
+                </a:ext>
+              </a:extLst>
+            </a:blip>
+            <a:stretch>
+              <a:fillRect/>
+            </a:stretch>
+          </p:blipFill>
+          <p:spPr>
+            <a:xfrm>
+              <a:off x="7979934" y="1740394"/>
+              <a:ext cx="1523480" cy="1523479"/>
+            </a:xfrm>
+            <a:prstGeom prst="rect">
+              <a:avLst/>
+            </a:prstGeom>
+            <a:ln>
+              <a:noFill/>
+            </a:ln>
+          </p:spPr>
+        </p:pic>
+        <p:pic>
+          <p:nvPicPr>
+            <p:cNvPr id="35" name="Picture 34" descr="A graph with red lines&#10;&#10;Description automatically generated">
+              <a:extLst>
+                <a:ext uri="{FF2B5EF4-FFF2-40B4-BE49-F238E27FC236}">
+                  <a16:creationId xmlns:a16="http://schemas.microsoft.com/office/drawing/2014/main" id="{0933BBF6-F9AD-4EFF-B6BD-C9D6DB964D18}"/>
+                </a:ext>
+              </a:extLst>
+            </p:cNvPr>
+            <p:cNvPicPr>
+              <a:picLocks noChangeAspect="1"/>
+            </p:cNvPicPr>
+            <p:nvPr/>
+          </p:nvPicPr>
+          <p:blipFill>
+            <a:blip r:embed="rId12">
+              <a:extLst>
+                <a:ext uri="{28A0092B-C50C-407E-A947-70E740481C1C}">
+                  <a14:useLocalDpi xmlns:a14="http://schemas.microsoft.com/office/drawing/2010/main" val="0"/>
+                </a:ext>
+              </a:extLst>
+            </a:blip>
+            <a:stretch>
+              <a:fillRect/>
+            </a:stretch>
+          </p:blipFill>
+          <p:spPr>
+            <a:xfrm>
+              <a:off x="4916583" y="1740394"/>
+              <a:ext cx="1523480" cy="1523479"/>
+            </a:xfrm>
+            <a:prstGeom prst="rect">
+              <a:avLst/>
+            </a:prstGeom>
+            <a:ln>
+              <a:noFill/>
+            </a:ln>
+          </p:spPr>
+        </p:pic>
+        <p:pic>
+          <p:nvPicPr>
+            <p:cNvPr id="36" name="Picture 35">
+              <a:extLst>
+                <a:ext uri="{FF2B5EF4-FFF2-40B4-BE49-F238E27FC236}">
+                  <a16:creationId xmlns:a16="http://schemas.microsoft.com/office/drawing/2014/main" id="{4BC56B52-1D9D-E491-348E-3B11AF8369F5}"/>
+                </a:ext>
+              </a:extLst>
+            </p:cNvPr>
+            <p:cNvPicPr>
+              <a:picLocks noChangeAspect="1"/>
+            </p:cNvPicPr>
+            <p:nvPr/>
+          </p:nvPicPr>
+          <p:blipFill>
+            <a:blip r:embed="rId13">
+              <a:extLst>
+                <a:ext uri="{28A0092B-C50C-407E-A947-70E740481C1C}">
+                  <a14:useLocalDpi xmlns:a14="http://schemas.microsoft.com/office/drawing/2010/main" val="0"/>
+                </a:ext>
+              </a:extLst>
+            </a:blip>
+            <a:stretch>
+              <a:fillRect/>
+            </a:stretch>
+          </p:blipFill>
+          <p:spPr>
+            <a:xfrm>
+              <a:off x="6448484" y="1740394"/>
+              <a:ext cx="1523480" cy="1523479"/>
+            </a:xfrm>
+            <a:prstGeom prst="rect">
+              <a:avLst/>
+            </a:prstGeom>
+            <a:ln>
+              <a:noFill/>
+            </a:ln>
+          </p:spPr>
+        </p:pic>
+      </p:grpSp>
+      <p:grpSp>
+        <p:nvGrpSpPr>
+          <p:cNvPr id="55" name="Group 54">
+            <a:extLst>
+              <a:ext uri="{FF2B5EF4-FFF2-40B4-BE49-F238E27FC236}">
+                <a16:creationId xmlns:a16="http://schemas.microsoft.com/office/drawing/2014/main" id="{34978457-6B4D-FFBA-0655-F63ABCD34456}"/>
+              </a:ext>
+            </a:extLst>
+          </p:cNvPr>
+          <p:cNvGrpSpPr/>
+          <p:nvPr/>
+        </p:nvGrpSpPr>
+        <p:grpSpPr>
+          <a:xfrm>
+            <a:off x="211756" y="1366106"/>
+            <a:ext cx="9291658" cy="191752"/>
+            <a:chOff x="211756" y="211074"/>
+            <a:chExt cx="9291658" cy="191752"/>
+          </a:xfrm>
+        </p:grpSpPr>
         <p:sp>
           <p:nvSpPr>
             <p:cNvPr id="10" name="TextBox 9">
@@ -6517,8 +6395,8 @@
           </p:nvSpPr>
           <p:spPr>
             <a:xfrm>
-              <a:off x="1671997" y="0"/>
-              <a:ext cx="1662806" cy="209288"/>
+              <a:off x="1743657" y="211074"/>
+              <a:ext cx="1523480" cy="191752"/>
             </a:xfrm>
             <a:prstGeom prst="rect">
               <a:avLst/>
@@ -6564,8 +6442,8 @@
           </p:nvSpPr>
           <p:spPr>
             <a:xfrm>
-              <a:off x="0" y="0"/>
-              <a:ext cx="1662806" cy="209288"/>
+              <a:off x="211756" y="211074"/>
+              <a:ext cx="1523480" cy="191752"/>
             </a:xfrm>
             <a:prstGeom prst="rect">
               <a:avLst/>
@@ -6611,8 +6489,8 @@
           </p:nvSpPr>
           <p:spPr>
             <a:xfrm>
-              <a:off x="3343503" y="0"/>
-              <a:ext cx="1662806" cy="209288"/>
+              <a:off x="3275107" y="211074"/>
+              <a:ext cx="1523480" cy="191752"/>
             </a:xfrm>
             <a:prstGeom prst="rect">
               <a:avLst/>
@@ -6645,6 +6523,167 @@
         </p:sp>
         <p:sp>
           <p:nvSpPr>
+            <p:cNvPr id="37" name="TextBox 36">
+              <a:extLst>
+                <a:ext uri="{FF2B5EF4-FFF2-40B4-BE49-F238E27FC236}">
+                  <a16:creationId xmlns:a16="http://schemas.microsoft.com/office/drawing/2014/main" id="{DB1DD628-2932-42F1-0BD4-F6A30669631F}"/>
+                </a:ext>
+              </a:extLst>
+            </p:cNvPr>
+            <p:cNvSpPr txBox="1"/>
+            <p:nvPr/>
+          </p:nvSpPr>
+          <p:spPr>
+            <a:xfrm>
+              <a:off x="4916583" y="211074"/>
+              <a:ext cx="1523480" cy="191752"/>
+            </a:xfrm>
+            <a:prstGeom prst="rect">
+              <a:avLst/>
+            </a:prstGeom>
+            <a:solidFill>
+              <a:schemeClr val="tx2">
+                <a:lumMod val="25000"/>
+                <a:lumOff val="75000"/>
+              </a:schemeClr>
+            </a:solidFill>
+            <a:ln>
+              <a:noFill/>
+            </a:ln>
+          </p:spPr>
+          <p:txBody>
+            <a:bodyPr wrap="square" tIns="9144">
+              <a:spAutoFit/>
+            </a:bodyPr>
+            <a:lstStyle/>
+            <a:p>
+              <a:pPr algn="ctr"/>
+              <a:r>
+                <a:rPr lang="en-US" sz="1000" dirty="0">
+                  <a:latin typeface="Times New Roman" panose="02020603050405020304" pitchFamily="18" charset="0"/>
+                  <a:cs typeface="Times New Roman" panose="02020603050405020304" pitchFamily="18" charset="0"/>
+                </a:rPr>
+                <a:t>(0.138, 0.02)</a:t>
+              </a:r>
+            </a:p>
+          </p:txBody>
+        </p:sp>
+        <p:sp>
+          <p:nvSpPr>
+            <p:cNvPr id="38" name="TextBox 37">
+              <a:extLst>
+                <a:ext uri="{FF2B5EF4-FFF2-40B4-BE49-F238E27FC236}">
+                  <a16:creationId xmlns:a16="http://schemas.microsoft.com/office/drawing/2014/main" id="{708B8631-D5AE-6AF4-7FF7-998E31F9E83A}"/>
+                </a:ext>
+              </a:extLst>
+            </p:cNvPr>
+            <p:cNvSpPr txBox="1"/>
+            <p:nvPr/>
+          </p:nvSpPr>
+          <p:spPr>
+            <a:xfrm>
+              <a:off x="6448484" y="211074"/>
+              <a:ext cx="1523480" cy="191752"/>
+            </a:xfrm>
+            <a:prstGeom prst="rect">
+              <a:avLst/>
+            </a:prstGeom>
+            <a:solidFill>
+              <a:schemeClr val="tx2">
+                <a:lumMod val="25000"/>
+                <a:lumOff val="75000"/>
+              </a:schemeClr>
+            </a:solidFill>
+            <a:ln>
+              <a:noFill/>
+            </a:ln>
+          </p:spPr>
+          <p:txBody>
+            <a:bodyPr wrap="square" tIns="9144">
+              <a:spAutoFit/>
+            </a:bodyPr>
+            <a:lstStyle/>
+            <a:p>
+              <a:pPr algn="ctr"/>
+              <a:r>
+                <a:rPr lang="en-US" sz="1000" dirty="0">
+                  <a:latin typeface="Times New Roman" panose="02020603050405020304" pitchFamily="18" charset="0"/>
+                  <a:cs typeface="Times New Roman" panose="02020603050405020304" pitchFamily="18" charset="0"/>
+                </a:rPr>
+                <a:t>(0.163, 0.019)</a:t>
+              </a:r>
+            </a:p>
+          </p:txBody>
+        </p:sp>
+        <p:sp>
+          <p:nvSpPr>
+            <p:cNvPr id="39" name="TextBox 38">
+              <a:extLst>
+                <a:ext uri="{FF2B5EF4-FFF2-40B4-BE49-F238E27FC236}">
+                  <a16:creationId xmlns:a16="http://schemas.microsoft.com/office/drawing/2014/main" id="{ED512F73-F888-A947-3C31-BE9C4B54B8B4}"/>
+                </a:ext>
+              </a:extLst>
+            </p:cNvPr>
+            <p:cNvSpPr txBox="1"/>
+            <p:nvPr/>
+          </p:nvSpPr>
+          <p:spPr>
+            <a:xfrm>
+              <a:off x="7979934" y="211074"/>
+              <a:ext cx="1523480" cy="191752"/>
+            </a:xfrm>
+            <a:prstGeom prst="rect">
+              <a:avLst/>
+            </a:prstGeom>
+            <a:solidFill>
+              <a:schemeClr val="bg1">
+                <a:lumMod val="85000"/>
+              </a:schemeClr>
+            </a:solidFill>
+            <a:ln>
+              <a:noFill/>
+            </a:ln>
+          </p:spPr>
+          <p:txBody>
+            <a:bodyPr wrap="square" tIns="9144">
+              <a:spAutoFit/>
+            </a:bodyPr>
+            <a:lstStyle/>
+            <a:p>
+              <a:pPr algn="ctr"/>
+              <a:r>
+                <a:rPr lang="en-US" sz="1000" dirty="0">
+                  <a:latin typeface="Times New Roman" panose="02020603050405020304" pitchFamily="18" charset="0"/>
+                  <a:cs typeface="Times New Roman" panose="02020603050405020304" pitchFamily="18" charset="0"/>
+                </a:rPr>
+                <a:t>(0.284, 0.334)</a:t>
+              </a:r>
+            </a:p>
+          </p:txBody>
+        </p:sp>
+      </p:grpSp>
+      <p:grpSp>
+        <p:nvGrpSpPr>
+          <p:cNvPr id="56" name="Group 55">
+            <a:extLst>
+              <a:ext uri="{FF2B5EF4-FFF2-40B4-BE49-F238E27FC236}">
+                <a16:creationId xmlns:a16="http://schemas.microsoft.com/office/drawing/2014/main" id="{B79AE1A7-2423-97D0-3E67-A72CC61D0D80}"/>
+              </a:ext>
+            </a:extLst>
+          </p:cNvPr>
+          <p:cNvGrpSpPr/>
+          <p:nvPr/>
+        </p:nvGrpSpPr>
+        <p:grpSpPr>
+          <a:xfrm>
+            <a:off x="211756" y="2895425"/>
+            <a:ext cx="9291658" cy="191752"/>
+            <a:chOff x="211756" y="1740393"/>
+            <a:chExt cx="9291658" cy="191752"/>
+          </a:xfrm>
+        </p:grpSpPr>
+        <p:sp>
+          <p:nvSpPr>
             <p:cNvPr id="13" name="TextBox 12">
               <a:extLst>
                 <a:ext uri="{FF2B5EF4-FFF2-40B4-BE49-F238E27FC236}">
@@ -6657,8 +6696,8 @@
           </p:nvSpPr>
           <p:spPr>
             <a:xfrm>
-              <a:off x="3343503" y="1667231"/>
-              <a:ext cx="1662806" cy="209288"/>
+              <a:off x="3275107" y="1740393"/>
+              <a:ext cx="1523480" cy="191752"/>
             </a:xfrm>
             <a:prstGeom prst="rect">
               <a:avLst/>
@@ -6703,8 +6742,8 @@
           </p:nvSpPr>
           <p:spPr>
             <a:xfrm>
-              <a:off x="0" y="1667231"/>
-              <a:ext cx="1662806" cy="209288"/>
+              <a:off x="211756" y="1740393"/>
+              <a:ext cx="1523480" cy="191752"/>
             </a:xfrm>
             <a:prstGeom prst="rect">
               <a:avLst/>
@@ -6750,8 +6789,8 @@
           </p:nvSpPr>
           <p:spPr>
             <a:xfrm>
-              <a:off x="1671997" y="1667231"/>
-              <a:ext cx="1662806" cy="209288"/>
+              <a:off x="1743657" y="1740393"/>
+              <a:ext cx="1523480" cy="191752"/>
             </a:xfrm>
             <a:prstGeom prst="rect">
               <a:avLst/>
@@ -6783,6 +6822,167 @@
             </a:p>
           </p:txBody>
         </p:sp>
+        <p:sp>
+          <p:nvSpPr>
+            <p:cNvPr id="40" name="TextBox 39">
+              <a:extLst>
+                <a:ext uri="{FF2B5EF4-FFF2-40B4-BE49-F238E27FC236}">
+                  <a16:creationId xmlns:a16="http://schemas.microsoft.com/office/drawing/2014/main" id="{25F38A80-B4B0-9B60-AF46-9D59143B46DD}"/>
+                </a:ext>
+              </a:extLst>
+            </p:cNvPr>
+            <p:cNvSpPr txBox="1"/>
+            <p:nvPr/>
+          </p:nvSpPr>
+          <p:spPr>
+            <a:xfrm>
+              <a:off x="4916583" y="1740393"/>
+              <a:ext cx="1523480" cy="191752"/>
+            </a:xfrm>
+            <a:prstGeom prst="rect">
+              <a:avLst/>
+            </a:prstGeom>
+            <a:solidFill>
+              <a:schemeClr val="tx2">
+                <a:lumMod val="25000"/>
+                <a:lumOff val="75000"/>
+              </a:schemeClr>
+            </a:solidFill>
+            <a:ln>
+              <a:noFill/>
+            </a:ln>
+          </p:spPr>
+          <p:txBody>
+            <a:bodyPr wrap="square" tIns="9144">
+              <a:spAutoFit/>
+            </a:bodyPr>
+            <a:lstStyle/>
+            <a:p>
+              <a:pPr algn="ctr"/>
+              <a:r>
+                <a:rPr lang="en-US" sz="1000" dirty="0">
+                  <a:latin typeface="Times New Roman" panose="02020603050405020304" pitchFamily="18" charset="0"/>
+                  <a:cs typeface="Times New Roman" panose="02020603050405020304" pitchFamily="18" charset="0"/>
+                </a:rPr>
+                <a:t>(0.586, 0.136)</a:t>
+              </a:r>
+            </a:p>
+          </p:txBody>
+        </p:sp>
+        <p:sp>
+          <p:nvSpPr>
+            <p:cNvPr id="41" name="TextBox 40">
+              <a:extLst>
+                <a:ext uri="{FF2B5EF4-FFF2-40B4-BE49-F238E27FC236}">
+                  <a16:creationId xmlns:a16="http://schemas.microsoft.com/office/drawing/2014/main" id="{A5F7A69C-05EE-E74D-7592-4DA742EC325A}"/>
+                </a:ext>
+              </a:extLst>
+            </p:cNvPr>
+            <p:cNvSpPr txBox="1"/>
+            <p:nvPr/>
+          </p:nvSpPr>
+          <p:spPr>
+            <a:xfrm>
+              <a:off x="6448484" y="1740393"/>
+              <a:ext cx="1523480" cy="191752"/>
+            </a:xfrm>
+            <a:prstGeom prst="rect">
+              <a:avLst/>
+            </a:prstGeom>
+            <a:solidFill>
+              <a:schemeClr val="tx2">
+                <a:lumMod val="25000"/>
+                <a:lumOff val="75000"/>
+              </a:schemeClr>
+            </a:solidFill>
+            <a:ln>
+              <a:noFill/>
+            </a:ln>
+          </p:spPr>
+          <p:txBody>
+            <a:bodyPr wrap="square" tIns="9144">
+              <a:spAutoFit/>
+            </a:bodyPr>
+            <a:lstStyle/>
+            <a:p>
+              <a:pPr algn="ctr"/>
+              <a:r>
+                <a:rPr lang="en-US" sz="1000" dirty="0">
+                  <a:latin typeface="Times New Roman" panose="02020603050405020304" pitchFamily="18" charset="0"/>
+                  <a:cs typeface="Times New Roman" panose="02020603050405020304" pitchFamily="18" charset="0"/>
+                </a:rPr>
+                <a:t>(0.646, 0.03)</a:t>
+              </a:r>
+            </a:p>
+          </p:txBody>
+        </p:sp>
+        <p:sp>
+          <p:nvSpPr>
+            <p:cNvPr id="42" name="TextBox 41">
+              <a:extLst>
+                <a:ext uri="{FF2B5EF4-FFF2-40B4-BE49-F238E27FC236}">
+                  <a16:creationId xmlns:a16="http://schemas.microsoft.com/office/drawing/2014/main" id="{88AC786C-0F8E-2BD0-A51C-69D188612B7C}"/>
+                </a:ext>
+              </a:extLst>
+            </p:cNvPr>
+            <p:cNvSpPr txBox="1"/>
+            <p:nvPr/>
+          </p:nvSpPr>
+          <p:spPr>
+            <a:xfrm>
+              <a:off x="7979934" y="1740393"/>
+              <a:ext cx="1523480" cy="191752"/>
+            </a:xfrm>
+            <a:prstGeom prst="rect">
+              <a:avLst/>
+            </a:prstGeom>
+            <a:solidFill>
+              <a:schemeClr val="bg1">
+                <a:lumMod val="85000"/>
+              </a:schemeClr>
+            </a:solidFill>
+            <a:ln>
+              <a:noFill/>
+            </a:ln>
+          </p:spPr>
+          <p:txBody>
+            <a:bodyPr wrap="square" tIns="9144">
+              <a:spAutoFit/>
+            </a:bodyPr>
+            <a:lstStyle/>
+            <a:p>
+              <a:pPr algn="ctr"/>
+              <a:r>
+                <a:rPr lang="en-US" sz="1000" dirty="0">
+                  <a:latin typeface="Times New Roman" panose="02020603050405020304" pitchFamily="18" charset="0"/>
+                  <a:cs typeface="Times New Roman" panose="02020603050405020304" pitchFamily="18" charset="0"/>
+                </a:rPr>
+                <a:t>(0.684, 0.41)</a:t>
+              </a:r>
+            </a:p>
+          </p:txBody>
+        </p:sp>
+      </p:grpSp>
+      <p:grpSp>
+        <p:nvGrpSpPr>
+          <p:cNvPr id="62" name="Group 61">
+            <a:extLst>
+              <a:ext uri="{FF2B5EF4-FFF2-40B4-BE49-F238E27FC236}">
+                <a16:creationId xmlns:a16="http://schemas.microsoft.com/office/drawing/2014/main" id="{DEF26768-1843-F457-3814-F5BAC785CEB6}"/>
+              </a:ext>
+            </a:extLst>
+          </p:cNvPr>
+          <p:cNvGrpSpPr/>
+          <p:nvPr/>
+        </p:nvGrpSpPr>
+        <p:grpSpPr>
+          <a:xfrm>
+            <a:off x="211756" y="4423377"/>
+            <a:ext cx="9291658" cy="1523480"/>
+            <a:chOff x="211756" y="3268345"/>
+            <a:chExt cx="9291658" cy="1523480"/>
+          </a:xfrm>
+        </p:grpSpPr>
         <p:pic>
           <p:nvPicPr>
             <p:cNvPr id="17" name="Picture 16" descr="A graph with lines and numbers&#10;&#10;Description automatically generated">
@@ -6798,7 +6998,7 @@
             <p:nvPr/>
           </p:nvPicPr>
           <p:blipFill>
-            <a:blip r:embed="rId8">
+            <a:blip r:embed="rId14">
               <a:extLst>
                 <a:ext uri="{28A0092B-C50C-407E-A947-70E740481C1C}">
                   <a14:useLocalDpi xmlns:a14="http://schemas.microsoft.com/office/drawing/2010/main" val="0"/>
@@ -6811,8 +7011,8 @@
           </p:blipFill>
           <p:spPr>
             <a:xfrm>
-              <a:off x="0" y="3335188"/>
-              <a:ext cx="1662806" cy="1662806"/>
+              <a:off x="211756" y="3268345"/>
+              <a:ext cx="1523480" cy="1523480"/>
             </a:xfrm>
             <a:prstGeom prst="rect">
               <a:avLst/>
@@ -6834,7 +7034,7 @@
             <p:nvPr/>
           </p:nvPicPr>
           <p:blipFill>
-            <a:blip r:embed="rId9">
+            <a:blip r:embed="rId15">
               <a:extLst>
                 <a:ext uri="{28A0092B-C50C-407E-A947-70E740481C1C}">
                   <a14:useLocalDpi xmlns:a14="http://schemas.microsoft.com/office/drawing/2010/main" val="0"/>
@@ -6847,8 +7047,8 @@
           </p:blipFill>
           <p:spPr>
             <a:xfrm>
-              <a:off x="1662806" y="3330037"/>
-              <a:ext cx="1662806" cy="1662806"/>
+              <a:off x="1735236" y="3268345"/>
+              <a:ext cx="1523480" cy="1523480"/>
             </a:xfrm>
             <a:prstGeom prst="rect">
               <a:avLst/>
@@ -6870,7 +7070,7 @@
             <p:nvPr/>
           </p:nvPicPr>
           <p:blipFill>
-            <a:blip r:embed="rId10">
+            <a:blip r:embed="rId16">
               <a:extLst>
                 <a:ext uri="{28A0092B-C50C-407E-A947-70E740481C1C}">
                   <a14:useLocalDpi xmlns:a14="http://schemas.microsoft.com/office/drawing/2010/main" val="0"/>
@@ -6883,14 +7083,143 @@
           </p:blipFill>
           <p:spPr>
             <a:xfrm>
-              <a:off x="3343503" y="3330037"/>
-              <a:ext cx="1662806" cy="1662806"/>
+              <a:off x="3275107" y="3268345"/>
+              <a:ext cx="1523480" cy="1523480"/>
             </a:xfrm>
             <a:prstGeom prst="rect">
               <a:avLst/>
             </a:prstGeom>
           </p:spPr>
         </p:pic>
+        <p:pic>
+          <p:nvPicPr>
+            <p:cNvPr id="43" name="Picture 42" descr="A diagram of a house&#10;&#10;Description automatically generated">
+              <a:extLst>
+                <a:ext uri="{FF2B5EF4-FFF2-40B4-BE49-F238E27FC236}">
+                  <a16:creationId xmlns:a16="http://schemas.microsoft.com/office/drawing/2014/main" id="{C6064FC6-F336-6595-99F9-FA77C02E0F18}"/>
+                </a:ext>
+              </a:extLst>
+            </p:cNvPr>
+            <p:cNvPicPr>
+              <a:picLocks noChangeAspect="1"/>
+            </p:cNvPicPr>
+            <p:nvPr/>
+          </p:nvPicPr>
+          <p:blipFill>
+            <a:blip r:embed="rId17">
+              <a:extLst>
+                <a:ext uri="{28A0092B-C50C-407E-A947-70E740481C1C}">
+                  <a14:useLocalDpi xmlns:a14="http://schemas.microsoft.com/office/drawing/2010/main" val="0"/>
+                </a:ext>
+              </a:extLst>
+            </a:blip>
+            <a:stretch>
+              <a:fillRect/>
+            </a:stretch>
+          </p:blipFill>
+          <p:spPr>
+            <a:xfrm>
+              <a:off x="7979934" y="3268346"/>
+              <a:ext cx="1523480" cy="1523479"/>
+            </a:xfrm>
+            <a:prstGeom prst="rect">
+              <a:avLst/>
+            </a:prstGeom>
+          </p:spPr>
+        </p:pic>
+        <p:pic>
+          <p:nvPicPr>
+            <p:cNvPr id="44" name="Picture 43" descr="A diagram of a house&#10;&#10;Description automatically generated">
+              <a:extLst>
+                <a:ext uri="{FF2B5EF4-FFF2-40B4-BE49-F238E27FC236}">
+                  <a16:creationId xmlns:a16="http://schemas.microsoft.com/office/drawing/2014/main" id="{97834A6D-382D-832D-B4BD-D4A0B6A3D3B6}"/>
+                </a:ext>
+              </a:extLst>
+            </p:cNvPr>
+            <p:cNvPicPr>
+              <a:picLocks noChangeAspect="1"/>
+            </p:cNvPicPr>
+            <p:nvPr/>
+          </p:nvPicPr>
+          <p:blipFill>
+            <a:blip r:embed="rId17">
+              <a:extLst>
+                <a:ext uri="{28A0092B-C50C-407E-A947-70E740481C1C}">
+                  <a14:useLocalDpi xmlns:a14="http://schemas.microsoft.com/office/drawing/2010/main" val="0"/>
+                </a:ext>
+              </a:extLst>
+            </a:blip>
+            <a:stretch>
+              <a:fillRect/>
+            </a:stretch>
+          </p:blipFill>
+          <p:spPr>
+            <a:xfrm>
+              <a:off x="4916583" y="3268346"/>
+              <a:ext cx="1523480" cy="1523479"/>
+            </a:xfrm>
+            <a:prstGeom prst="rect">
+              <a:avLst/>
+            </a:prstGeom>
+          </p:spPr>
+        </p:pic>
+        <p:pic>
+          <p:nvPicPr>
+            <p:cNvPr id="45" name="Picture 44" descr="A grid with lines and a diagram&#10;&#10;Description automatically generated with medium confidence">
+              <a:extLst>
+                <a:ext uri="{FF2B5EF4-FFF2-40B4-BE49-F238E27FC236}">
+                  <a16:creationId xmlns:a16="http://schemas.microsoft.com/office/drawing/2014/main" id="{6AA070FB-F7C7-BAEA-CB79-AF2F8022287D}"/>
+                </a:ext>
+              </a:extLst>
+            </p:cNvPr>
+            <p:cNvPicPr>
+              <a:picLocks noChangeAspect="1"/>
+            </p:cNvPicPr>
+            <p:nvPr/>
+          </p:nvPicPr>
+          <p:blipFill>
+            <a:blip r:embed="rId18">
+              <a:extLst>
+                <a:ext uri="{28A0092B-C50C-407E-A947-70E740481C1C}">
+                  <a14:useLocalDpi xmlns:a14="http://schemas.microsoft.com/office/drawing/2010/main" val="0"/>
+                </a:ext>
+              </a:extLst>
+            </a:blip>
+            <a:stretch>
+              <a:fillRect/>
+            </a:stretch>
+          </p:blipFill>
+          <p:spPr>
+            <a:xfrm>
+              <a:off x="6440063" y="3268346"/>
+              <a:ext cx="1523480" cy="1523479"/>
+            </a:xfrm>
+            <a:prstGeom prst="rect">
+              <a:avLst/>
+            </a:prstGeom>
+          </p:spPr>
+        </p:pic>
+      </p:grpSp>
+      <p:grpSp>
+        <p:nvGrpSpPr>
+          <p:cNvPr id="57" name="Group 56">
+            <a:extLst>
+              <a:ext uri="{FF2B5EF4-FFF2-40B4-BE49-F238E27FC236}">
+                <a16:creationId xmlns:a16="http://schemas.microsoft.com/office/drawing/2014/main" id="{6779A284-F864-5CD4-547E-D86D513CDE8F}"/>
+              </a:ext>
+            </a:extLst>
+          </p:cNvPr>
+          <p:cNvGrpSpPr/>
+          <p:nvPr/>
+        </p:nvGrpSpPr>
+        <p:grpSpPr>
+          <a:xfrm>
+            <a:off x="211756" y="4423377"/>
+            <a:ext cx="9291658" cy="191752"/>
+            <a:chOff x="211756" y="3271825"/>
+            <a:chExt cx="9291658" cy="191752"/>
+          </a:xfrm>
+        </p:grpSpPr>
         <p:sp>
           <p:nvSpPr>
             <p:cNvPr id="20" name="TextBox 19">
@@ -6905,8 +7234,8 @@
           </p:nvSpPr>
           <p:spPr>
             <a:xfrm>
-              <a:off x="3343503" y="3334463"/>
-              <a:ext cx="1662806" cy="209288"/>
+              <a:off x="3275107" y="3271825"/>
+              <a:ext cx="1523480" cy="191752"/>
             </a:xfrm>
             <a:prstGeom prst="rect">
               <a:avLst/>
@@ -6951,8 +7280,8 @@
           </p:nvSpPr>
           <p:spPr>
             <a:xfrm>
-              <a:off x="0" y="3334463"/>
-              <a:ext cx="1662806" cy="209288"/>
+              <a:off x="211756" y="3271825"/>
+              <a:ext cx="1523480" cy="191752"/>
             </a:xfrm>
             <a:prstGeom prst="rect">
               <a:avLst/>
@@ -6998,8 +7327,8 @@
           </p:nvSpPr>
           <p:spPr>
             <a:xfrm>
-              <a:off x="1671997" y="3334463"/>
-              <a:ext cx="1662806" cy="209288"/>
+              <a:off x="1743657" y="3271825"/>
+              <a:ext cx="1523480" cy="191752"/>
             </a:xfrm>
             <a:prstGeom prst="rect">
               <a:avLst/>
@@ -7031,6 +7360,167 @@
             </a:p>
           </p:txBody>
         </p:sp>
+        <p:sp>
+          <p:nvSpPr>
+            <p:cNvPr id="46" name="TextBox 45">
+              <a:extLst>
+                <a:ext uri="{FF2B5EF4-FFF2-40B4-BE49-F238E27FC236}">
+                  <a16:creationId xmlns:a16="http://schemas.microsoft.com/office/drawing/2014/main" id="{5E3900B9-0439-E3CD-4B55-A16DF98E8DA3}"/>
+                </a:ext>
+              </a:extLst>
+            </p:cNvPr>
+            <p:cNvSpPr txBox="1"/>
+            <p:nvPr/>
+          </p:nvSpPr>
+          <p:spPr>
+            <a:xfrm>
+              <a:off x="4916583" y="3271825"/>
+              <a:ext cx="1523480" cy="191752"/>
+            </a:xfrm>
+            <a:prstGeom prst="rect">
+              <a:avLst/>
+            </a:prstGeom>
+            <a:solidFill>
+              <a:schemeClr val="tx2">
+                <a:lumMod val="25000"/>
+                <a:lumOff val="75000"/>
+              </a:schemeClr>
+            </a:solidFill>
+            <a:ln>
+              <a:noFill/>
+            </a:ln>
+          </p:spPr>
+          <p:txBody>
+            <a:bodyPr wrap="square" tIns="9144">
+              <a:spAutoFit/>
+            </a:bodyPr>
+            <a:lstStyle/>
+            <a:p>
+              <a:pPr algn="ctr"/>
+              <a:r>
+                <a:rPr lang="en-US" sz="1000" dirty="0">
+                  <a:latin typeface="Times New Roman" panose="02020603050405020304" pitchFamily="18" charset="0"/>
+                  <a:cs typeface="Times New Roman" panose="02020603050405020304" pitchFamily="18" charset="0"/>
+                </a:rPr>
+                <a:t>(0.299, 0.197)</a:t>
+              </a:r>
+            </a:p>
+          </p:txBody>
+        </p:sp>
+        <p:sp>
+          <p:nvSpPr>
+            <p:cNvPr id="47" name="TextBox 46">
+              <a:extLst>
+                <a:ext uri="{FF2B5EF4-FFF2-40B4-BE49-F238E27FC236}">
+                  <a16:creationId xmlns:a16="http://schemas.microsoft.com/office/drawing/2014/main" id="{4043A69E-CD86-508E-9F68-645C11D1DA21}"/>
+                </a:ext>
+              </a:extLst>
+            </p:cNvPr>
+            <p:cNvSpPr txBox="1"/>
+            <p:nvPr/>
+          </p:nvSpPr>
+          <p:spPr>
+            <a:xfrm>
+              <a:off x="6448484" y="3271825"/>
+              <a:ext cx="1523480" cy="191752"/>
+            </a:xfrm>
+            <a:prstGeom prst="rect">
+              <a:avLst/>
+            </a:prstGeom>
+            <a:solidFill>
+              <a:schemeClr val="tx2">
+                <a:lumMod val="25000"/>
+                <a:lumOff val="75000"/>
+              </a:schemeClr>
+            </a:solidFill>
+            <a:ln>
+              <a:noFill/>
+            </a:ln>
+          </p:spPr>
+          <p:txBody>
+            <a:bodyPr wrap="square" tIns="9144">
+              <a:spAutoFit/>
+            </a:bodyPr>
+            <a:lstStyle/>
+            <a:p>
+              <a:pPr algn="ctr"/>
+              <a:r>
+                <a:rPr lang="en-US" sz="1000" dirty="0">
+                  <a:latin typeface="Times New Roman" panose="02020603050405020304" pitchFamily="18" charset="0"/>
+                  <a:cs typeface="Times New Roman" panose="02020603050405020304" pitchFamily="18" charset="0"/>
+                </a:rPr>
+                <a:t>(0.563, 0.025)</a:t>
+              </a:r>
+            </a:p>
+          </p:txBody>
+        </p:sp>
+        <p:sp>
+          <p:nvSpPr>
+            <p:cNvPr id="48" name="TextBox 47">
+              <a:extLst>
+                <a:ext uri="{FF2B5EF4-FFF2-40B4-BE49-F238E27FC236}">
+                  <a16:creationId xmlns:a16="http://schemas.microsoft.com/office/drawing/2014/main" id="{6B9CE594-03FB-16A0-718E-6C4382ED9CDF}"/>
+                </a:ext>
+              </a:extLst>
+            </p:cNvPr>
+            <p:cNvSpPr txBox="1"/>
+            <p:nvPr/>
+          </p:nvSpPr>
+          <p:spPr>
+            <a:xfrm>
+              <a:off x="7979934" y="3271825"/>
+              <a:ext cx="1523480" cy="191752"/>
+            </a:xfrm>
+            <a:prstGeom prst="rect">
+              <a:avLst/>
+            </a:prstGeom>
+            <a:solidFill>
+              <a:schemeClr val="bg1">
+                <a:lumMod val="85000"/>
+              </a:schemeClr>
+            </a:solidFill>
+            <a:ln>
+              <a:noFill/>
+            </a:ln>
+          </p:spPr>
+          <p:txBody>
+            <a:bodyPr wrap="square" tIns="9144">
+              <a:spAutoFit/>
+            </a:bodyPr>
+            <a:lstStyle/>
+            <a:p>
+              <a:pPr algn="ctr"/>
+              <a:r>
+                <a:rPr lang="en-US" sz="1000" dirty="0">
+                  <a:latin typeface="Times New Roman" panose="02020603050405020304" pitchFamily="18" charset="0"/>
+                  <a:cs typeface="Times New Roman" panose="02020603050405020304" pitchFamily="18" charset="0"/>
+                </a:rPr>
+                <a:t>(0.322, 0.15)</a:t>
+              </a:r>
+            </a:p>
+          </p:txBody>
+        </p:sp>
+      </p:grpSp>
+      <p:grpSp>
+        <p:nvGrpSpPr>
+          <p:cNvPr id="61" name="Group 60">
+            <a:extLst>
+              <a:ext uri="{FF2B5EF4-FFF2-40B4-BE49-F238E27FC236}">
+                <a16:creationId xmlns:a16="http://schemas.microsoft.com/office/drawing/2014/main" id="{4EE1BC0E-9B8E-0B97-1A86-EE7B4D2B65F4}"/>
+              </a:ext>
+            </a:extLst>
+          </p:cNvPr>
+          <p:cNvGrpSpPr/>
+          <p:nvPr/>
+        </p:nvGrpSpPr>
+        <p:grpSpPr>
+          <a:xfrm>
+            <a:off x="211756" y="5957144"/>
+            <a:ext cx="9291658" cy="1523480"/>
+            <a:chOff x="211756" y="4802112"/>
+            <a:chExt cx="9291658" cy="1523480"/>
+          </a:xfrm>
+        </p:grpSpPr>
         <p:pic>
           <p:nvPicPr>
             <p:cNvPr id="23" name="Picture 22" descr="A diagram of a house&#10;&#10;Description automatically generated">
@@ -7046,7 +7536,7 @@
             <p:nvPr/>
           </p:nvPicPr>
           <p:blipFill>
-            <a:blip r:embed="rId11">
+            <a:blip r:embed="rId19">
               <a:extLst>
                 <a:ext uri="{28A0092B-C50C-407E-A947-70E740481C1C}">
                   <a14:useLocalDpi xmlns:a14="http://schemas.microsoft.com/office/drawing/2010/main" val="0"/>
@@ -7059,8 +7549,8 @@
           </p:blipFill>
           <p:spPr>
             <a:xfrm>
-              <a:off x="0" y="4992843"/>
-              <a:ext cx="1662806" cy="1662806"/>
+              <a:off x="211756" y="4802112"/>
+              <a:ext cx="1523480" cy="1523480"/>
             </a:xfrm>
             <a:prstGeom prst="rect">
               <a:avLst/>
@@ -7082,7 +7572,7 @@
             <p:nvPr/>
           </p:nvPicPr>
           <p:blipFill>
-            <a:blip r:embed="rId12">
+            <a:blip r:embed="rId20">
               <a:extLst>
                 <a:ext uri="{28A0092B-C50C-407E-A947-70E740481C1C}">
                   <a14:useLocalDpi xmlns:a14="http://schemas.microsoft.com/office/drawing/2010/main" val="0"/>
@@ -7095,8 +7585,8 @@
           </p:blipFill>
           <p:spPr>
             <a:xfrm>
-              <a:off x="1662315" y="4997268"/>
-              <a:ext cx="1662806" cy="1662806"/>
+              <a:off x="1734786" y="4802112"/>
+              <a:ext cx="1523480" cy="1523480"/>
             </a:xfrm>
             <a:prstGeom prst="rect">
               <a:avLst/>
@@ -7118,7 +7608,7 @@
             <p:nvPr/>
           </p:nvPicPr>
           <p:blipFill>
-            <a:blip r:embed="rId13">
+            <a:blip r:embed="rId21">
               <a:extLst>
                 <a:ext uri="{28A0092B-C50C-407E-A947-70E740481C1C}">
                   <a14:useLocalDpi xmlns:a14="http://schemas.microsoft.com/office/drawing/2010/main" val="0"/>
@@ -7131,14 +7621,143 @@
           </p:blipFill>
           <p:spPr>
             <a:xfrm>
-              <a:off x="3343503" y="4992843"/>
-              <a:ext cx="1662806" cy="1662806"/>
+              <a:off x="3275107" y="4802112"/>
+              <a:ext cx="1523480" cy="1523480"/>
             </a:xfrm>
             <a:prstGeom prst="rect">
               <a:avLst/>
             </a:prstGeom>
           </p:spPr>
         </p:pic>
+        <p:pic>
+          <p:nvPicPr>
+            <p:cNvPr id="49" name="Picture 48" descr="A grid with red and black lines&#10;&#10;Description automatically generated">
+              <a:extLst>
+                <a:ext uri="{FF2B5EF4-FFF2-40B4-BE49-F238E27FC236}">
+                  <a16:creationId xmlns:a16="http://schemas.microsoft.com/office/drawing/2014/main" id="{D3C80052-8D2F-7210-BB6E-09E3D857AB38}"/>
+                </a:ext>
+              </a:extLst>
+            </p:cNvPr>
+            <p:cNvPicPr>
+              <a:picLocks noChangeAspect="1"/>
+            </p:cNvPicPr>
+            <p:nvPr/>
+          </p:nvPicPr>
+          <p:blipFill>
+            <a:blip r:embed="rId22">
+              <a:extLst>
+                <a:ext uri="{28A0092B-C50C-407E-A947-70E740481C1C}">
+                  <a14:useLocalDpi xmlns:a14="http://schemas.microsoft.com/office/drawing/2010/main" val="0"/>
+                </a:ext>
+              </a:extLst>
+            </a:blip>
+            <a:stretch>
+              <a:fillRect/>
+            </a:stretch>
+          </p:blipFill>
+          <p:spPr>
+            <a:xfrm>
+              <a:off x="7979934" y="4802113"/>
+              <a:ext cx="1523480" cy="1523479"/>
+            </a:xfrm>
+            <a:prstGeom prst="rect">
+              <a:avLst/>
+            </a:prstGeom>
+          </p:spPr>
+        </p:pic>
+        <p:pic>
+          <p:nvPicPr>
+            <p:cNvPr id="50" name="Picture 49" descr="A diagram of a graph&#10;&#10;Description automatically generated with medium confidence">
+              <a:extLst>
+                <a:ext uri="{FF2B5EF4-FFF2-40B4-BE49-F238E27FC236}">
+                  <a16:creationId xmlns:a16="http://schemas.microsoft.com/office/drawing/2014/main" id="{0A2EDF1E-E064-5417-02CD-E01CE86AE064}"/>
+                </a:ext>
+              </a:extLst>
+            </p:cNvPr>
+            <p:cNvPicPr>
+              <a:picLocks noChangeAspect="1"/>
+            </p:cNvPicPr>
+            <p:nvPr/>
+          </p:nvPicPr>
+          <p:blipFill>
+            <a:blip r:embed="rId23">
+              <a:extLst>
+                <a:ext uri="{28A0092B-C50C-407E-A947-70E740481C1C}">
+                  <a14:useLocalDpi xmlns:a14="http://schemas.microsoft.com/office/drawing/2010/main" val="0"/>
+                </a:ext>
+              </a:extLst>
+            </a:blip>
+            <a:stretch>
+              <a:fillRect/>
+            </a:stretch>
+          </p:blipFill>
+          <p:spPr>
+            <a:xfrm>
+              <a:off x="4925004" y="4802113"/>
+              <a:ext cx="1523480" cy="1523479"/>
+            </a:xfrm>
+            <a:prstGeom prst="rect">
+              <a:avLst/>
+            </a:prstGeom>
+          </p:spPr>
+        </p:pic>
+        <p:pic>
+          <p:nvPicPr>
+            <p:cNvPr id="51" name="Picture 50" descr="A graph of a diagram&#10;&#10;Description automatically generated with medium confidence">
+              <a:extLst>
+                <a:ext uri="{FF2B5EF4-FFF2-40B4-BE49-F238E27FC236}">
+                  <a16:creationId xmlns:a16="http://schemas.microsoft.com/office/drawing/2014/main" id="{78359FEA-06A6-9BF1-9B8D-BA76FCBFFDCF}"/>
+                </a:ext>
+              </a:extLst>
+            </p:cNvPr>
+            <p:cNvPicPr>
+              <a:picLocks noChangeAspect="1"/>
+            </p:cNvPicPr>
+            <p:nvPr/>
+          </p:nvPicPr>
+          <p:blipFill>
+            <a:blip r:embed="rId24">
+              <a:extLst>
+                <a:ext uri="{28A0092B-C50C-407E-A947-70E740481C1C}">
+                  <a14:useLocalDpi xmlns:a14="http://schemas.microsoft.com/office/drawing/2010/main" val="0"/>
+                </a:ext>
+              </a:extLst>
+            </a:blip>
+            <a:stretch>
+              <a:fillRect/>
+            </a:stretch>
+          </p:blipFill>
+          <p:spPr>
+            <a:xfrm>
+              <a:off x="6448034" y="4802113"/>
+              <a:ext cx="1523480" cy="1523479"/>
+            </a:xfrm>
+            <a:prstGeom prst="rect">
+              <a:avLst/>
+            </a:prstGeom>
+          </p:spPr>
+        </p:pic>
+      </p:grpSp>
+      <p:grpSp>
+        <p:nvGrpSpPr>
+          <p:cNvPr id="60" name="Group 59">
+            <a:extLst>
+              <a:ext uri="{FF2B5EF4-FFF2-40B4-BE49-F238E27FC236}">
+                <a16:creationId xmlns:a16="http://schemas.microsoft.com/office/drawing/2014/main" id="{DD2AEDF9-BDF1-D2DB-DEBC-245EAD29CA6A}"/>
+              </a:ext>
+            </a:extLst>
+          </p:cNvPr>
+          <p:cNvGrpSpPr/>
+          <p:nvPr/>
+        </p:nvGrpSpPr>
+        <p:grpSpPr>
+          <a:xfrm>
+            <a:off x="211756" y="5957144"/>
+            <a:ext cx="9291658" cy="191752"/>
+            <a:chOff x="211756" y="4805220"/>
+            <a:chExt cx="9291658" cy="191752"/>
+          </a:xfrm>
+        </p:grpSpPr>
         <p:sp>
           <p:nvSpPr>
             <p:cNvPr id="26" name="TextBox 25">
@@ -7153,8 +7772,8 @@
           </p:nvSpPr>
           <p:spPr>
             <a:xfrm>
-              <a:off x="3343503" y="5002419"/>
-              <a:ext cx="1662806" cy="209288"/>
+              <a:off x="3275107" y="4805220"/>
+              <a:ext cx="1523480" cy="191752"/>
             </a:xfrm>
             <a:prstGeom prst="rect">
               <a:avLst/>
@@ -7199,8 +7818,8 @@
           </p:nvSpPr>
           <p:spPr>
             <a:xfrm>
-              <a:off x="0" y="5002419"/>
-              <a:ext cx="1662806" cy="209288"/>
+              <a:off x="211756" y="4805220"/>
+              <a:ext cx="1523480" cy="191752"/>
             </a:xfrm>
             <a:prstGeom prst="rect">
               <a:avLst/>
@@ -7246,8 +7865,8 @@
           </p:nvSpPr>
           <p:spPr>
             <a:xfrm>
-              <a:off x="1671997" y="5002419"/>
-              <a:ext cx="1662806" cy="209288"/>
+              <a:off x="1743657" y="4805220"/>
+              <a:ext cx="1523480" cy="191752"/>
             </a:xfrm>
             <a:prstGeom prst="rect">
               <a:avLst/>
@@ -7279,897 +7898,6 @@
             </a:p>
           </p:txBody>
         </p:sp>
-      </p:grpSp>
-      <p:grpSp>
-        <p:nvGrpSpPr>
-          <p:cNvPr id="58" name="Group 57">
-            <a:extLst>
-              <a:ext uri="{FF2B5EF4-FFF2-40B4-BE49-F238E27FC236}">
-                <a16:creationId xmlns:a16="http://schemas.microsoft.com/office/drawing/2014/main" id="{5012825C-7A64-529A-7326-1255792024B6}"/>
-              </a:ext>
-            </a:extLst>
-          </p:cNvPr>
-          <p:cNvGrpSpPr/>
-          <p:nvPr/>
-        </p:nvGrpSpPr>
-        <p:grpSpPr>
-          <a:xfrm>
-            <a:off x="5024200" y="-19020"/>
-            <a:ext cx="5006309" cy="6698114"/>
-            <a:chOff x="5282011" y="44693"/>
-            <a:chExt cx="5006309" cy="6698114"/>
-          </a:xfrm>
-        </p:grpSpPr>
-        <p:pic>
-          <p:nvPicPr>
-            <p:cNvPr id="31" name="Picture 30">
-              <a:extLst>
-                <a:ext uri="{FF2B5EF4-FFF2-40B4-BE49-F238E27FC236}">
-                  <a16:creationId xmlns:a16="http://schemas.microsoft.com/office/drawing/2014/main" id="{B6A08E42-87B5-1959-D3D7-397CB7D75041}"/>
-                </a:ext>
-              </a:extLst>
-            </p:cNvPr>
-            <p:cNvPicPr>
-              <a:picLocks noChangeAspect="1"/>
-            </p:cNvPicPr>
-            <p:nvPr/>
-          </p:nvPicPr>
-          <p:blipFill>
-            <a:blip r:embed="rId14">
-              <a:extLst>
-                <a:ext uri="{28A0092B-C50C-407E-A947-70E740481C1C}">
-                  <a14:useLocalDpi xmlns:a14="http://schemas.microsoft.com/office/drawing/2010/main" val="0"/>
-                </a:ext>
-              </a:extLst>
-            </a:blip>
-            <a:stretch>
-              <a:fillRect/>
-            </a:stretch>
-          </p:blipFill>
-          <p:spPr>
-            <a:xfrm>
-              <a:off x="6954008" y="44693"/>
-              <a:ext cx="1662806" cy="1662805"/>
-            </a:xfrm>
-            <a:prstGeom prst="rect">
-              <a:avLst/>
-            </a:prstGeom>
-            <a:ln>
-              <a:noFill/>
-            </a:ln>
-          </p:spPr>
-        </p:pic>
-        <p:pic>
-          <p:nvPicPr>
-            <p:cNvPr id="32" name="Picture 31" descr="A graph of a line graph&#10;&#10;Description automatically generated">
-              <a:extLst>
-                <a:ext uri="{FF2B5EF4-FFF2-40B4-BE49-F238E27FC236}">
-                  <a16:creationId xmlns:a16="http://schemas.microsoft.com/office/drawing/2014/main" id="{15B83C38-A45D-BEE9-2C70-8AF054B0711F}"/>
-                </a:ext>
-              </a:extLst>
-            </p:cNvPr>
-            <p:cNvPicPr>
-              <a:picLocks noChangeAspect="1"/>
-            </p:cNvPicPr>
-            <p:nvPr/>
-          </p:nvPicPr>
-          <p:blipFill>
-            <a:blip r:embed="rId15">
-              <a:extLst>
-                <a:ext uri="{28A0092B-C50C-407E-A947-70E740481C1C}">
-                  <a14:useLocalDpi xmlns:a14="http://schemas.microsoft.com/office/drawing/2010/main" val="0"/>
-                </a:ext>
-              </a:extLst>
-            </a:blip>
-            <a:stretch>
-              <a:fillRect/>
-            </a:stretch>
-          </p:blipFill>
-          <p:spPr>
-            <a:xfrm>
-              <a:off x="5282011" y="44693"/>
-              <a:ext cx="1662806" cy="1662805"/>
-            </a:xfrm>
-            <a:prstGeom prst="rect">
-              <a:avLst/>
-            </a:prstGeom>
-            <a:ln>
-              <a:noFill/>
-            </a:ln>
-          </p:spPr>
-        </p:pic>
-        <p:pic>
-          <p:nvPicPr>
-            <p:cNvPr id="33" name="Picture 32" descr="A graph of a line graph&#10;&#10;Description automatically generated with medium confidence">
-              <a:extLst>
-                <a:ext uri="{FF2B5EF4-FFF2-40B4-BE49-F238E27FC236}">
-                  <a16:creationId xmlns:a16="http://schemas.microsoft.com/office/drawing/2014/main" id="{11741553-C5EF-742B-3EF3-269D6ABF2364}"/>
-                </a:ext>
-              </a:extLst>
-            </p:cNvPr>
-            <p:cNvPicPr>
-              <a:picLocks noChangeAspect="1"/>
-            </p:cNvPicPr>
-            <p:nvPr/>
-          </p:nvPicPr>
-          <p:blipFill>
-            <a:blip r:embed="rId16">
-              <a:extLst>
-                <a:ext uri="{28A0092B-C50C-407E-A947-70E740481C1C}">
-                  <a14:useLocalDpi xmlns:a14="http://schemas.microsoft.com/office/drawing/2010/main" val="0"/>
-                </a:ext>
-              </a:extLst>
-            </a:blip>
-            <a:stretch>
-              <a:fillRect/>
-            </a:stretch>
-          </p:blipFill>
-          <p:spPr>
-            <a:xfrm>
-              <a:off x="8625514" y="44693"/>
-              <a:ext cx="1662806" cy="1662805"/>
-            </a:xfrm>
-            <a:prstGeom prst="rect">
-              <a:avLst/>
-            </a:prstGeom>
-            <a:ln>
-              <a:noFill/>
-            </a:ln>
-          </p:spPr>
-        </p:pic>
-        <p:pic>
-          <p:nvPicPr>
-            <p:cNvPr id="34" name="Picture 33" descr="A diagram of a building&#10;&#10;Description automatically generated">
-              <a:extLst>
-                <a:ext uri="{FF2B5EF4-FFF2-40B4-BE49-F238E27FC236}">
-                  <a16:creationId xmlns:a16="http://schemas.microsoft.com/office/drawing/2014/main" id="{36D6C0F1-9D85-5B89-B0B4-8012EACA235F}"/>
-                </a:ext>
-              </a:extLst>
-            </p:cNvPr>
-            <p:cNvPicPr>
-              <a:picLocks noChangeAspect="1"/>
-            </p:cNvPicPr>
-            <p:nvPr/>
-          </p:nvPicPr>
-          <p:blipFill>
-            <a:blip r:embed="rId17">
-              <a:extLst>
-                <a:ext uri="{28A0092B-C50C-407E-A947-70E740481C1C}">
-                  <a14:useLocalDpi xmlns:a14="http://schemas.microsoft.com/office/drawing/2010/main" val="0"/>
-                </a:ext>
-              </a:extLst>
-            </a:blip>
-            <a:stretch>
-              <a:fillRect/>
-            </a:stretch>
-          </p:blipFill>
-          <p:spPr>
-            <a:xfrm>
-              <a:off x="8625514" y="1715821"/>
-              <a:ext cx="1662806" cy="1662805"/>
-            </a:xfrm>
-            <a:prstGeom prst="rect">
-              <a:avLst/>
-            </a:prstGeom>
-            <a:ln>
-              <a:noFill/>
-            </a:ln>
-          </p:spPr>
-        </p:pic>
-        <p:pic>
-          <p:nvPicPr>
-            <p:cNvPr id="35" name="Picture 34" descr="A graph with red lines&#10;&#10;Description automatically generated">
-              <a:extLst>
-                <a:ext uri="{FF2B5EF4-FFF2-40B4-BE49-F238E27FC236}">
-                  <a16:creationId xmlns:a16="http://schemas.microsoft.com/office/drawing/2014/main" id="{0933BBF6-F9AD-4EFF-B6BD-C9D6DB964D18}"/>
-                </a:ext>
-              </a:extLst>
-            </p:cNvPr>
-            <p:cNvPicPr>
-              <a:picLocks noChangeAspect="1"/>
-            </p:cNvPicPr>
-            <p:nvPr/>
-          </p:nvPicPr>
-          <p:blipFill>
-            <a:blip r:embed="rId18">
-              <a:extLst>
-                <a:ext uri="{28A0092B-C50C-407E-A947-70E740481C1C}">
-                  <a14:useLocalDpi xmlns:a14="http://schemas.microsoft.com/office/drawing/2010/main" val="0"/>
-                </a:ext>
-              </a:extLst>
-            </a:blip>
-            <a:stretch>
-              <a:fillRect/>
-            </a:stretch>
-          </p:blipFill>
-          <p:spPr>
-            <a:xfrm>
-              <a:off x="5282011" y="1715821"/>
-              <a:ext cx="1662806" cy="1662805"/>
-            </a:xfrm>
-            <a:prstGeom prst="rect">
-              <a:avLst/>
-            </a:prstGeom>
-            <a:ln>
-              <a:noFill/>
-            </a:ln>
-          </p:spPr>
-        </p:pic>
-        <p:pic>
-          <p:nvPicPr>
-            <p:cNvPr id="36" name="Picture 35">
-              <a:extLst>
-                <a:ext uri="{FF2B5EF4-FFF2-40B4-BE49-F238E27FC236}">
-                  <a16:creationId xmlns:a16="http://schemas.microsoft.com/office/drawing/2014/main" id="{4BC56B52-1D9D-E491-348E-3B11AF8369F5}"/>
-                </a:ext>
-              </a:extLst>
-            </p:cNvPr>
-            <p:cNvPicPr>
-              <a:picLocks noChangeAspect="1"/>
-            </p:cNvPicPr>
-            <p:nvPr/>
-          </p:nvPicPr>
-          <p:blipFill>
-            <a:blip r:embed="rId19">
-              <a:extLst>
-                <a:ext uri="{28A0092B-C50C-407E-A947-70E740481C1C}">
-                  <a14:useLocalDpi xmlns:a14="http://schemas.microsoft.com/office/drawing/2010/main" val="0"/>
-                </a:ext>
-              </a:extLst>
-            </a:blip>
-            <a:stretch>
-              <a:fillRect/>
-            </a:stretch>
-          </p:blipFill>
-          <p:spPr>
-            <a:xfrm>
-              <a:off x="6954008" y="1715821"/>
-              <a:ext cx="1662806" cy="1662805"/>
-            </a:xfrm>
-            <a:prstGeom prst="rect">
-              <a:avLst/>
-            </a:prstGeom>
-            <a:ln>
-              <a:noFill/>
-            </a:ln>
-          </p:spPr>
-        </p:pic>
-        <p:sp>
-          <p:nvSpPr>
-            <p:cNvPr id="37" name="TextBox 36">
-              <a:extLst>
-                <a:ext uri="{FF2B5EF4-FFF2-40B4-BE49-F238E27FC236}">
-                  <a16:creationId xmlns:a16="http://schemas.microsoft.com/office/drawing/2014/main" id="{DB1DD628-2932-42F1-0BD4-F6A30669631F}"/>
-                </a:ext>
-              </a:extLst>
-            </p:cNvPr>
-            <p:cNvSpPr txBox="1"/>
-            <p:nvPr/>
-          </p:nvSpPr>
-          <p:spPr>
-            <a:xfrm>
-              <a:off x="5282011" y="44693"/>
-              <a:ext cx="1662806" cy="209288"/>
-            </a:xfrm>
-            <a:prstGeom prst="rect">
-              <a:avLst/>
-            </a:prstGeom>
-            <a:solidFill>
-              <a:schemeClr val="tx2">
-                <a:lumMod val="25000"/>
-                <a:lumOff val="75000"/>
-              </a:schemeClr>
-            </a:solidFill>
-            <a:ln>
-              <a:noFill/>
-            </a:ln>
-          </p:spPr>
-          <p:txBody>
-            <a:bodyPr wrap="square" tIns="9144">
-              <a:spAutoFit/>
-            </a:bodyPr>
-            <a:lstStyle/>
-            <a:p>
-              <a:pPr algn="ctr"/>
-              <a:r>
-                <a:rPr lang="en-US" sz="1000" dirty="0">
-                  <a:latin typeface="Times New Roman" panose="02020603050405020304" pitchFamily="18" charset="0"/>
-                  <a:cs typeface="Times New Roman" panose="02020603050405020304" pitchFamily="18" charset="0"/>
-                </a:rPr>
-                <a:t>(0.138, 0.02)</a:t>
-              </a:r>
-            </a:p>
-          </p:txBody>
-        </p:sp>
-        <p:sp>
-          <p:nvSpPr>
-            <p:cNvPr id="38" name="TextBox 37">
-              <a:extLst>
-                <a:ext uri="{FF2B5EF4-FFF2-40B4-BE49-F238E27FC236}">
-                  <a16:creationId xmlns:a16="http://schemas.microsoft.com/office/drawing/2014/main" id="{708B8631-D5AE-6AF4-7FF7-998E31F9E83A}"/>
-                </a:ext>
-              </a:extLst>
-            </p:cNvPr>
-            <p:cNvSpPr txBox="1"/>
-            <p:nvPr/>
-          </p:nvSpPr>
-          <p:spPr>
-            <a:xfrm>
-              <a:off x="6954008" y="44693"/>
-              <a:ext cx="1662806" cy="209288"/>
-            </a:xfrm>
-            <a:prstGeom prst="rect">
-              <a:avLst/>
-            </a:prstGeom>
-            <a:solidFill>
-              <a:schemeClr val="tx2">
-                <a:lumMod val="25000"/>
-                <a:lumOff val="75000"/>
-              </a:schemeClr>
-            </a:solidFill>
-            <a:ln>
-              <a:noFill/>
-            </a:ln>
-          </p:spPr>
-          <p:txBody>
-            <a:bodyPr wrap="square" tIns="9144">
-              <a:spAutoFit/>
-            </a:bodyPr>
-            <a:lstStyle/>
-            <a:p>
-              <a:pPr algn="ctr"/>
-              <a:r>
-                <a:rPr lang="en-US" sz="1000" dirty="0">
-                  <a:latin typeface="Times New Roman" panose="02020603050405020304" pitchFamily="18" charset="0"/>
-                  <a:cs typeface="Times New Roman" panose="02020603050405020304" pitchFamily="18" charset="0"/>
-                </a:rPr>
-                <a:t>(0.163, 0.019)</a:t>
-              </a:r>
-            </a:p>
-          </p:txBody>
-        </p:sp>
-        <p:sp>
-          <p:nvSpPr>
-            <p:cNvPr id="39" name="TextBox 38">
-              <a:extLst>
-                <a:ext uri="{FF2B5EF4-FFF2-40B4-BE49-F238E27FC236}">
-                  <a16:creationId xmlns:a16="http://schemas.microsoft.com/office/drawing/2014/main" id="{ED512F73-F888-A947-3C31-BE9C4B54B8B4}"/>
-                </a:ext>
-              </a:extLst>
-            </p:cNvPr>
-            <p:cNvSpPr txBox="1"/>
-            <p:nvPr/>
-          </p:nvSpPr>
-          <p:spPr>
-            <a:xfrm>
-              <a:off x="8625514" y="44693"/>
-              <a:ext cx="1662806" cy="209288"/>
-            </a:xfrm>
-            <a:prstGeom prst="rect">
-              <a:avLst/>
-            </a:prstGeom>
-            <a:solidFill>
-              <a:schemeClr val="bg1">
-                <a:lumMod val="85000"/>
-              </a:schemeClr>
-            </a:solidFill>
-            <a:ln>
-              <a:noFill/>
-            </a:ln>
-          </p:spPr>
-          <p:txBody>
-            <a:bodyPr wrap="square" tIns="9144">
-              <a:spAutoFit/>
-            </a:bodyPr>
-            <a:lstStyle/>
-            <a:p>
-              <a:pPr algn="ctr"/>
-              <a:r>
-                <a:rPr lang="en-US" sz="1000" dirty="0">
-                  <a:latin typeface="Times New Roman" panose="02020603050405020304" pitchFamily="18" charset="0"/>
-                  <a:cs typeface="Times New Roman" panose="02020603050405020304" pitchFamily="18" charset="0"/>
-                </a:rPr>
-                <a:t>(0.284, 0.334)</a:t>
-              </a:r>
-            </a:p>
-          </p:txBody>
-        </p:sp>
-        <p:sp>
-          <p:nvSpPr>
-            <p:cNvPr id="40" name="TextBox 39">
-              <a:extLst>
-                <a:ext uri="{FF2B5EF4-FFF2-40B4-BE49-F238E27FC236}">
-                  <a16:creationId xmlns:a16="http://schemas.microsoft.com/office/drawing/2014/main" id="{25F38A80-B4B0-9B60-AF46-9D59143B46DD}"/>
-                </a:ext>
-              </a:extLst>
-            </p:cNvPr>
-            <p:cNvSpPr txBox="1"/>
-            <p:nvPr/>
-          </p:nvSpPr>
-          <p:spPr>
-            <a:xfrm>
-              <a:off x="5282011" y="1715821"/>
-              <a:ext cx="1662806" cy="209288"/>
-            </a:xfrm>
-            <a:prstGeom prst="rect">
-              <a:avLst/>
-            </a:prstGeom>
-            <a:solidFill>
-              <a:schemeClr val="tx2">
-                <a:lumMod val="25000"/>
-                <a:lumOff val="75000"/>
-              </a:schemeClr>
-            </a:solidFill>
-            <a:ln>
-              <a:noFill/>
-            </a:ln>
-          </p:spPr>
-          <p:txBody>
-            <a:bodyPr wrap="square" tIns="9144">
-              <a:spAutoFit/>
-            </a:bodyPr>
-            <a:lstStyle/>
-            <a:p>
-              <a:pPr algn="ctr"/>
-              <a:r>
-                <a:rPr lang="en-US" sz="1000" dirty="0">
-                  <a:latin typeface="Times New Roman" panose="02020603050405020304" pitchFamily="18" charset="0"/>
-                  <a:cs typeface="Times New Roman" panose="02020603050405020304" pitchFamily="18" charset="0"/>
-                </a:rPr>
-                <a:t>(0.586, 0.136)</a:t>
-              </a:r>
-            </a:p>
-          </p:txBody>
-        </p:sp>
-        <p:sp>
-          <p:nvSpPr>
-            <p:cNvPr id="41" name="TextBox 40">
-              <a:extLst>
-                <a:ext uri="{FF2B5EF4-FFF2-40B4-BE49-F238E27FC236}">
-                  <a16:creationId xmlns:a16="http://schemas.microsoft.com/office/drawing/2014/main" id="{A5F7A69C-05EE-E74D-7592-4DA742EC325A}"/>
-                </a:ext>
-              </a:extLst>
-            </p:cNvPr>
-            <p:cNvSpPr txBox="1"/>
-            <p:nvPr/>
-          </p:nvSpPr>
-          <p:spPr>
-            <a:xfrm>
-              <a:off x="6954008" y="1715821"/>
-              <a:ext cx="1662806" cy="209288"/>
-            </a:xfrm>
-            <a:prstGeom prst="rect">
-              <a:avLst/>
-            </a:prstGeom>
-            <a:solidFill>
-              <a:schemeClr val="tx2">
-                <a:lumMod val="25000"/>
-                <a:lumOff val="75000"/>
-              </a:schemeClr>
-            </a:solidFill>
-            <a:ln>
-              <a:noFill/>
-            </a:ln>
-          </p:spPr>
-          <p:txBody>
-            <a:bodyPr wrap="square" tIns="9144">
-              <a:spAutoFit/>
-            </a:bodyPr>
-            <a:lstStyle/>
-            <a:p>
-              <a:pPr algn="ctr"/>
-              <a:r>
-                <a:rPr lang="en-US" sz="1000" dirty="0">
-                  <a:latin typeface="Times New Roman" panose="02020603050405020304" pitchFamily="18" charset="0"/>
-                  <a:cs typeface="Times New Roman" panose="02020603050405020304" pitchFamily="18" charset="0"/>
-                </a:rPr>
-                <a:t>(0.646, 0.03)</a:t>
-              </a:r>
-            </a:p>
-          </p:txBody>
-        </p:sp>
-        <p:sp>
-          <p:nvSpPr>
-            <p:cNvPr id="42" name="TextBox 41">
-              <a:extLst>
-                <a:ext uri="{FF2B5EF4-FFF2-40B4-BE49-F238E27FC236}">
-                  <a16:creationId xmlns:a16="http://schemas.microsoft.com/office/drawing/2014/main" id="{88AC786C-0F8E-2BD0-A51C-69D188612B7C}"/>
-                </a:ext>
-              </a:extLst>
-            </p:cNvPr>
-            <p:cNvSpPr txBox="1"/>
-            <p:nvPr/>
-          </p:nvSpPr>
-          <p:spPr>
-            <a:xfrm>
-              <a:off x="8625514" y="1715821"/>
-              <a:ext cx="1662806" cy="209288"/>
-            </a:xfrm>
-            <a:prstGeom prst="rect">
-              <a:avLst/>
-            </a:prstGeom>
-            <a:solidFill>
-              <a:schemeClr val="bg1">
-                <a:lumMod val="85000"/>
-              </a:schemeClr>
-            </a:solidFill>
-            <a:ln>
-              <a:noFill/>
-            </a:ln>
-          </p:spPr>
-          <p:txBody>
-            <a:bodyPr wrap="square" tIns="9144">
-              <a:spAutoFit/>
-            </a:bodyPr>
-            <a:lstStyle/>
-            <a:p>
-              <a:pPr algn="ctr"/>
-              <a:r>
-                <a:rPr lang="en-US" sz="1000" dirty="0">
-                  <a:latin typeface="Times New Roman" panose="02020603050405020304" pitchFamily="18" charset="0"/>
-                  <a:cs typeface="Times New Roman" panose="02020603050405020304" pitchFamily="18" charset="0"/>
-                </a:rPr>
-                <a:t>(0.684, 0.41)</a:t>
-              </a:r>
-            </a:p>
-          </p:txBody>
-        </p:sp>
-        <p:pic>
-          <p:nvPicPr>
-            <p:cNvPr id="43" name="Picture 42" descr="A diagram of a house&#10;&#10;Description automatically generated">
-              <a:extLst>
-                <a:ext uri="{FF2B5EF4-FFF2-40B4-BE49-F238E27FC236}">
-                  <a16:creationId xmlns:a16="http://schemas.microsoft.com/office/drawing/2014/main" id="{C6064FC6-F336-6595-99F9-FA77C02E0F18}"/>
-                </a:ext>
-              </a:extLst>
-            </p:cNvPr>
-            <p:cNvPicPr>
-              <a:picLocks noChangeAspect="1"/>
-            </p:cNvPicPr>
-            <p:nvPr/>
-          </p:nvPicPr>
-          <p:blipFill>
-            <a:blip r:embed="rId20">
-              <a:extLst>
-                <a:ext uri="{28A0092B-C50C-407E-A947-70E740481C1C}">
-                  <a14:useLocalDpi xmlns:a14="http://schemas.microsoft.com/office/drawing/2010/main" val="0"/>
-                </a:ext>
-              </a:extLst>
-            </a:blip>
-            <a:stretch>
-              <a:fillRect/>
-            </a:stretch>
-          </p:blipFill>
-          <p:spPr>
-            <a:xfrm>
-              <a:off x="8625514" y="3389589"/>
-              <a:ext cx="1662806" cy="1662805"/>
-            </a:xfrm>
-            <a:prstGeom prst="rect">
-              <a:avLst/>
-            </a:prstGeom>
-          </p:spPr>
-        </p:pic>
-        <p:pic>
-          <p:nvPicPr>
-            <p:cNvPr id="44" name="Picture 43" descr="A diagram of a house&#10;&#10;Description automatically generated">
-              <a:extLst>
-                <a:ext uri="{FF2B5EF4-FFF2-40B4-BE49-F238E27FC236}">
-                  <a16:creationId xmlns:a16="http://schemas.microsoft.com/office/drawing/2014/main" id="{97834A6D-382D-832D-B4BD-D4A0B6A3D3B6}"/>
-                </a:ext>
-              </a:extLst>
-            </p:cNvPr>
-            <p:cNvPicPr>
-              <a:picLocks noChangeAspect="1"/>
-            </p:cNvPicPr>
-            <p:nvPr/>
-          </p:nvPicPr>
-          <p:blipFill>
-            <a:blip r:embed="rId20">
-              <a:extLst>
-                <a:ext uri="{28A0092B-C50C-407E-A947-70E740481C1C}">
-                  <a14:useLocalDpi xmlns:a14="http://schemas.microsoft.com/office/drawing/2010/main" val="0"/>
-                </a:ext>
-              </a:extLst>
-            </a:blip>
-            <a:stretch>
-              <a:fillRect/>
-            </a:stretch>
-          </p:blipFill>
-          <p:spPr>
-            <a:xfrm>
-              <a:off x="5282011" y="3397911"/>
-              <a:ext cx="1662806" cy="1662805"/>
-            </a:xfrm>
-            <a:prstGeom prst="rect">
-              <a:avLst/>
-            </a:prstGeom>
-          </p:spPr>
-        </p:pic>
-        <p:pic>
-          <p:nvPicPr>
-            <p:cNvPr id="45" name="Picture 44" descr="A grid with lines and a diagram&#10;&#10;Description automatically generated with medium confidence">
-              <a:extLst>
-                <a:ext uri="{FF2B5EF4-FFF2-40B4-BE49-F238E27FC236}">
-                  <a16:creationId xmlns:a16="http://schemas.microsoft.com/office/drawing/2014/main" id="{6AA070FB-F7C7-BAEA-CB79-AF2F8022287D}"/>
-                </a:ext>
-              </a:extLst>
-            </p:cNvPr>
-            <p:cNvPicPr>
-              <a:picLocks noChangeAspect="1"/>
-            </p:cNvPicPr>
-            <p:nvPr/>
-          </p:nvPicPr>
-          <p:blipFill>
-            <a:blip r:embed="rId21">
-              <a:extLst>
-                <a:ext uri="{28A0092B-C50C-407E-A947-70E740481C1C}">
-                  <a14:useLocalDpi xmlns:a14="http://schemas.microsoft.com/office/drawing/2010/main" val="0"/>
-                </a:ext>
-              </a:extLst>
-            </a:blip>
-            <a:stretch>
-              <a:fillRect/>
-            </a:stretch>
-          </p:blipFill>
-          <p:spPr>
-            <a:xfrm>
-              <a:off x="6944817" y="3389589"/>
-              <a:ext cx="1662806" cy="1662805"/>
-            </a:xfrm>
-            <a:prstGeom prst="rect">
-              <a:avLst/>
-            </a:prstGeom>
-          </p:spPr>
-        </p:pic>
-        <p:sp>
-          <p:nvSpPr>
-            <p:cNvPr id="46" name="TextBox 45">
-              <a:extLst>
-                <a:ext uri="{FF2B5EF4-FFF2-40B4-BE49-F238E27FC236}">
-                  <a16:creationId xmlns:a16="http://schemas.microsoft.com/office/drawing/2014/main" id="{5E3900B9-0439-E3CD-4B55-A16DF98E8DA3}"/>
-                </a:ext>
-              </a:extLst>
-            </p:cNvPr>
-            <p:cNvSpPr txBox="1"/>
-            <p:nvPr/>
-          </p:nvSpPr>
-          <p:spPr>
-            <a:xfrm>
-              <a:off x="5282011" y="3397911"/>
-              <a:ext cx="1662806" cy="209288"/>
-            </a:xfrm>
-            <a:prstGeom prst="rect">
-              <a:avLst/>
-            </a:prstGeom>
-            <a:solidFill>
-              <a:schemeClr val="tx2">
-                <a:lumMod val="25000"/>
-                <a:lumOff val="75000"/>
-              </a:schemeClr>
-            </a:solidFill>
-            <a:ln>
-              <a:noFill/>
-            </a:ln>
-          </p:spPr>
-          <p:txBody>
-            <a:bodyPr wrap="square" tIns="9144">
-              <a:spAutoFit/>
-            </a:bodyPr>
-            <a:lstStyle/>
-            <a:p>
-              <a:pPr algn="ctr"/>
-              <a:r>
-                <a:rPr lang="en-US" sz="1000" dirty="0">
-                  <a:latin typeface="Times New Roman" panose="02020603050405020304" pitchFamily="18" charset="0"/>
-                  <a:cs typeface="Times New Roman" panose="02020603050405020304" pitchFamily="18" charset="0"/>
-                </a:rPr>
-                <a:t>(0.299, 0.197)</a:t>
-              </a:r>
-            </a:p>
-          </p:txBody>
-        </p:sp>
-        <p:sp>
-          <p:nvSpPr>
-            <p:cNvPr id="47" name="TextBox 46">
-              <a:extLst>
-                <a:ext uri="{FF2B5EF4-FFF2-40B4-BE49-F238E27FC236}">
-                  <a16:creationId xmlns:a16="http://schemas.microsoft.com/office/drawing/2014/main" id="{4043A69E-CD86-508E-9F68-645C11D1DA21}"/>
-                </a:ext>
-              </a:extLst>
-            </p:cNvPr>
-            <p:cNvSpPr txBox="1"/>
-            <p:nvPr/>
-          </p:nvSpPr>
-          <p:spPr>
-            <a:xfrm>
-              <a:off x="6954008" y="3397911"/>
-              <a:ext cx="1662806" cy="209288"/>
-            </a:xfrm>
-            <a:prstGeom prst="rect">
-              <a:avLst/>
-            </a:prstGeom>
-            <a:solidFill>
-              <a:schemeClr val="tx2">
-                <a:lumMod val="25000"/>
-                <a:lumOff val="75000"/>
-              </a:schemeClr>
-            </a:solidFill>
-            <a:ln>
-              <a:noFill/>
-            </a:ln>
-          </p:spPr>
-          <p:txBody>
-            <a:bodyPr wrap="square" tIns="9144">
-              <a:spAutoFit/>
-            </a:bodyPr>
-            <a:lstStyle/>
-            <a:p>
-              <a:pPr algn="ctr"/>
-              <a:r>
-                <a:rPr lang="en-US" sz="1000" dirty="0">
-                  <a:latin typeface="Times New Roman" panose="02020603050405020304" pitchFamily="18" charset="0"/>
-                  <a:cs typeface="Times New Roman" panose="02020603050405020304" pitchFamily="18" charset="0"/>
-                </a:rPr>
-                <a:t>(0.563, 0.025)</a:t>
-              </a:r>
-            </a:p>
-          </p:txBody>
-        </p:sp>
-        <p:sp>
-          <p:nvSpPr>
-            <p:cNvPr id="48" name="TextBox 47">
-              <a:extLst>
-                <a:ext uri="{FF2B5EF4-FFF2-40B4-BE49-F238E27FC236}">
-                  <a16:creationId xmlns:a16="http://schemas.microsoft.com/office/drawing/2014/main" id="{6B9CE594-03FB-16A0-718E-6C4382ED9CDF}"/>
-                </a:ext>
-              </a:extLst>
-            </p:cNvPr>
-            <p:cNvSpPr txBox="1"/>
-            <p:nvPr/>
-          </p:nvSpPr>
-          <p:spPr>
-            <a:xfrm>
-              <a:off x="8625514" y="3397911"/>
-              <a:ext cx="1662806" cy="209288"/>
-            </a:xfrm>
-            <a:prstGeom prst="rect">
-              <a:avLst/>
-            </a:prstGeom>
-            <a:solidFill>
-              <a:schemeClr val="bg1">
-                <a:lumMod val="85000"/>
-              </a:schemeClr>
-            </a:solidFill>
-            <a:ln>
-              <a:noFill/>
-            </a:ln>
-          </p:spPr>
-          <p:txBody>
-            <a:bodyPr wrap="square" tIns="9144">
-              <a:spAutoFit/>
-            </a:bodyPr>
-            <a:lstStyle/>
-            <a:p>
-              <a:pPr algn="ctr"/>
-              <a:r>
-                <a:rPr lang="en-US" sz="1000" dirty="0">
-                  <a:latin typeface="Times New Roman" panose="02020603050405020304" pitchFamily="18" charset="0"/>
-                  <a:cs typeface="Times New Roman" panose="02020603050405020304" pitchFamily="18" charset="0"/>
-                </a:rPr>
-                <a:t>(0.322, 0.15)</a:t>
-              </a:r>
-            </a:p>
-          </p:txBody>
-        </p:sp>
-        <p:pic>
-          <p:nvPicPr>
-            <p:cNvPr id="49" name="Picture 48" descr="A grid with red and black lines&#10;&#10;Description automatically generated">
-              <a:extLst>
-                <a:ext uri="{FF2B5EF4-FFF2-40B4-BE49-F238E27FC236}">
-                  <a16:creationId xmlns:a16="http://schemas.microsoft.com/office/drawing/2014/main" id="{D3C80052-8D2F-7210-BB6E-09E3D857AB38}"/>
-                </a:ext>
-              </a:extLst>
-            </p:cNvPr>
-            <p:cNvPicPr>
-              <a:picLocks noChangeAspect="1"/>
-            </p:cNvPicPr>
-            <p:nvPr/>
-          </p:nvPicPr>
-          <p:blipFill>
-            <a:blip r:embed="rId22">
-              <a:extLst>
-                <a:ext uri="{28A0092B-C50C-407E-A947-70E740481C1C}">
-                  <a14:useLocalDpi xmlns:a14="http://schemas.microsoft.com/office/drawing/2010/main" val="0"/>
-                </a:ext>
-              </a:extLst>
-            </a:blip>
-            <a:stretch>
-              <a:fillRect/>
-            </a:stretch>
-          </p:blipFill>
-          <p:spPr>
-            <a:xfrm>
-              <a:off x="8625514" y="5080002"/>
-              <a:ext cx="1662806" cy="1662805"/>
-            </a:xfrm>
-            <a:prstGeom prst="rect">
-              <a:avLst/>
-            </a:prstGeom>
-          </p:spPr>
-        </p:pic>
-        <p:pic>
-          <p:nvPicPr>
-            <p:cNvPr id="50" name="Picture 49" descr="A diagram of a graph&#10;&#10;Description automatically generated with medium confidence">
-              <a:extLst>
-                <a:ext uri="{FF2B5EF4-FFF2-40B4-BE49-F238E27FC236}">
-                  <a16:creationId xmlns:a16="http://schemas.microsoft.com/office/drawing/2014/main" id="{0A2EDF1E-E064-5417-02CD-E01CE86AE064}"/>
-                </a:ext>
-              </a:extLst>
-            </p:cNvPr>
-            <p:cNvPicPr>
-              <a:picLocks noChangeAspect="1"/>
-            </p:cNvPicPr>
-            <p:nvPr/>
-          </p:nvPicPr>
-          <p:blipFill>
-            <a:blip r:embed="rId23">
-              <a:extLst>
-                <a:ext uri="{28A0092B-C50C-407E-A947-70E740481C1C}">
-                  <a14:useLocalDpi xmlns:a14="http://schemas.microsoft.com/office/drawing/2010/main" val="0"/>
-                </a:ext>
-              </a:extLst>
-            </a:blip>
-            <a:stretch>
-              <a:fillRect/>
-            </a:stretch>
-          </p:blipFill>
-          <p:spPr>
-            <a:xfrm>
-              <a:off x="5291202" y="5080002"/>
-              <a:ext cx="1662806" cy="1662805"/>
-            </a:xfrm>
-            <a:prstGeom prst="rect">
-              <a:avLst/>
-            </a:prstGeom>
-          </p:spPr>
-        </p:pic>
-        <p:pic>
-          <p:nvPicPr>
-            <p:cNvPr id="51" name="Picture 50" descr="A graph of a diagram&#10;&#10;Description automatically generated with medium confidence">
-              <a:extLst>
-                <a:ext uri="{FF2B5EF4-FFF2-40B4-BE49-F238E27FC236}">
-                  <a16:creationId xmlns:a16="http://schemas.microsoft.com/office/drawing/2014/main" id="{78359FEA-06A6-9BF1-9B8D-BA76FCBFFDCF}"/>
-                </a:ext>
-              </a:extLst>
-            </p:cNvPr>
-            <p:cNvPicPr>
-              <a:picLocks noChangeAspect="1"/>
-            </p:cNvPicPr>
-            <p:nvPr/>
-          </p:nvPicPr>
-          <p:blipFill>
-            <a:blip r:embed="rId24">
-              <a:extLst>
-                <a:ext uri="{28A0092B-C50C-407E-A947-70E740481C1C}">
-                  <a14:useLocalDpi xmlns:a14="http://schemas.microsoft.com/office/drawing/2010/main" val="0"/>
-                </a:ext>
-              </a:extLst>
-            </a:blip>
-            <a:stretch>
-              <a:fillRect/>
-            </a:stretch>
-          </p:blipFill>
-          <p:spPr>
-            <a:xfrm>
-              <a:off x="6953517" y="5080002"/>
-              <a:ext cx="1662806" cy="1662805"/>
-            </a:xfrm>
-            <a:prstGeom prst="rect">
-              <a:avLst/>
-            </a:prstGeom>
-          </p:spPr>
-        </p:pic>
         <p:sp>
           <p:nvSpPr>
             <p:cNvPr id="52" name="TextBox 51">
@@ -8184,8 +7912,8 @@
           </p:nvSpPr>
           <p:spPr>
             <a:xfrm>
-              <a:off x="5282011" y="5077210"/>
-              <a:ext cx="1662806" cy="209288"/>
+              <a:off x="4916583" y="4805220"/>
+              <a:ext cx="1523480" cy="191752"/>
             </a:xfrm>
             <a:prstGeom prst="rect">
               <a:avLst/>
@@ -8231,8 +7959,8 @@
           </p:nvSpPr>
           <p:spPr>
             <a:xfrm>
-              <a:off x="6954008" y="5077210"/>
-              <a:ext cx="1662806" cy="209288"/>
+              <a:off x="6448484" y="4805220"/>
+              <a:ext cx="1523480" cy="191752"/>
             </a:xfrm>
             <a:prstGeom prst="rect">
               <a:avLst/>
@@ -8278,8 +8006,8 @@
           </p:nvSpPr>
           <p:spPr>
             <a:xfrm>
-              <a:off x="8625514" y="5077210"/>
-              <a:ext cx="1662806" cy="209288"/>
+              <a:off x="7979934" y="4805220"/>
+              <a:ext cx="1523480" cy="191752"/>
             </a:xfrm>
             <a:prstGeom prst="rect">
               <a:avLst/>
@@ -8311,6 +8039,1073 @@
           </p:txBody>
         </p:sp>
       </p:grpSp>
+      <p:graphicFrame>
+        <p:nvGraphicFramePr>
+          <p:cNvPr id="29" name="Table 28">
+            <a:extLst>
+              <a:ext uri="{FF2B5EF4-FFF2-40B4-BE49-F238E27FC236}">
+                <a16:creationId xmlns:a16="http://schemas.microsoft.com/office/drawing/2014/main" id="{25031B9B-24FA-DCAE-403A-A40E87B3A06D}"/>
+              </a:ext>
+            </a:extLst>
+          </p:cNvPr>
+          <p:cNvGraphicFramePr>
+            <a:graphicFrameLocks noGrp="1"/>
+          </p:cNvGraphicFramePr>
+          <p:nvPr>
+            <p:extLst>
+              <p:ext uri="{D42A27DB-BD31-4B8C-83A1-F6EECF244321}">
+                <p14:modId xmlns:p14="http://schemas.microsoft.com/office/powerpoint/2010/main" val="3652477157"/>
+              </p:ext>
+            </p:extLst>
+          </p:nvPr>
+        </p:nvGraphicFramePr>
+        <p:xfrm>
+          <a:off x="76200" y="1364688"/>
+          <a:ext cx="135329" cy="6097980"/>
+        </p:xfrm>
+        <a:graphic>
+          <a:graphicData uri="http://schemas.openxmlformats.org/drawingml/2006/table">
+            <a:tbl>
+              <a:tblPr firstRow="1" bandRow="1">
+                <a:tableStyleId>{5940675A-B579-460E-94D1-54222C63F5DA}</a:tableStyleId>
+              </a:tblPr>
+              <a:tblGrid>
+                <a:gridCol w="135329">
+                  <a:extLst>
+                    <a:ext uri="{9D8B030D-6E8A-4147-A177-3AD203B41FA5}">
+                      <a16:colId xmlns:a16="http://schemas.microsoft.com/office/drawing/2014/main" val="3147524444"/>
+                    </a:ext>
+                  </a:extLst>
+                </a:gridCol>
+              </a:tblGrid>
+              <a:tr h="1524495">
+                <a:tc>
+                  <a:txBody>
+                    <a:bodyPr/>
+                    <a:lstStyle/>
+                    <a:p>
+                      <a:pPr algn="ctr"/>
+                      <a:r>
+                        <a:rPr lang="en-US" sz="1200" b="1" dirty="0">
+                          <a:latin typeface="Times New Roman" panose="02020603050405020304" pitchFamily="18" charset="0"/>
+                          <a:cs typeface="Times New Roman" panose="02020603050405020304" pitchFamily="18" charset="0"/>
+                        </a:rPr>
+                        <a:t>1</a:t>
+                      </a:r>
+                    </a:p>
+                  </a:txBody>
+                  <a:tcPr marL="9144" marR="9144" anchor="ctr">
+                    <a:lnL w="6350" cap="flat" cmpd="sng" algn="ctr">
+                      <a:solidFill>
+                        <a:schemeClr val="tx1"/>
+                      </a:solidFill>
+                      <a:prstDash val="solid"/>
+                      <a:round/>
+                      <a:headEnd type="none" w="med" len="med"/>
+                      <a:tailEnd type="none" w="med" len="med"/>
+                    </a:lnL>
+                    <a:lnR w="6350" cap="flat" cmpd="sng" algn="ctr">
+                      <a:solidFill>
+                        <a:schemeClr val="tx1"/>
+                      </a:solidFill>
+                      <a:prstDash val="solid"/>
+                      <a:round/>
+                      <a:headEnd type="none" w="med" len="med"/>
+                      <a:tailEnd type="none" w="med" len="med"/>
+                    </a:lnR>
+                    <a:lnT w="6350" cap="flat" cmpd="sng" algn="ctr">
+                      <a:solidFill>
+                        <a:schemeClr val="tx1"/>
+                      </a:solidFill>
+                      <a:prstDash val="solid"/>
+                      <a:round/>
+                      <a:headEnd type="none" w="med" len="med"/>
+                      <a:tailEnd type="none" w="med" len="med"/>
+                    </a:lnT>
+                    <a:lnB w="6350" cap="flat" cmpd="sng" algn="ctr">
+                      <a:solidFill>
+                        <a:schemeClr val="tx1"/>
+                      </a:solidFill>
+                      <a:prstDash val="solid"/>
+                      <a:round/>
+                      <a:headEnd type="none" w="med" len="med"/>
+                      <a:tailEnd type="none" w="med" len="med"/>
+                    </a:lnB>
+                    <a:solidFill>
+                      <a:schemeClr val="bg1">
+                        <a:lumMod val="95000"/>
+                      </a:schemeClr>
+                    </a:solidFill>
+                  </a:tcPr>
+                </a:tc>
+                <a:extLst>
+                  <a:ext uri="{0D108BD9-81ED-4DB2-BD59-A6C34878D82A}">
+                    <a16:rowId xmlns:a16="http://schemas.microsoft.com/office/drawing/2014/main" val="540773323"/>
+                  </a:ext>
+                </a:extLst>
+              </a:tr>
+              <a:tr h="1524495">
+                <a:tc>
+                  <a:txBody>
+                    <a:bodyPr/>
+                    <a:lstStyle/>
+                    <a:p>
+                      <a:pPr algn="ctr"/>
+                      <a:r>
+                        <a:rPr lang="en-US" sz="1200" b="1" dirty="0">
+                          <a:latin typeface="Times New Roman" panose="02020603050405020304" pitchFamily="18" charset="0"/>
+                          <a:cs typeface="Times New Roman" panose="02020603050405020304" pitchFamily="18" charset="0"/>
+                        </a:rPr>
+                        <a:t>2</a:t>
+                      </a:r>
+                    </a:p>
+                  </a:txBody>
+                  <a:tcPr marL="9144" marR="9144" anchor="ctr">
+                    <a:lnL w="6350" cap="flat" cmpd="sng" algn="ctr">
+                      <a:solidFill>
+                        <a:schemeClr val="tx1"/>
+                      </a:solidFill>
+                      <a:prstDash val="solid"/>
+                      <a:round/>
+                      <a:headEnd type="none" w="med" len="med"/>
+                      <a:tailEnd type="none" w="med" len="med"/>
+                    </a:lnL>
+                    <a:lnR w="6350" cap="flat" cmpd="sng" algn="ctr">
+                      <a:solidFill>
+                        <a:schemeClr val="tx1"/>
+                      </a:solidFill>
+                      <a:prstDash val="solid"/>
+                      <a:round/>
+                      <a:headEnd type="none" w="med" len="med"/>
+                      <a:tailEnd type="none" w="med" len="med"/>
+                    </a:lnR>
+                    <a:lnT w="6350" cap="flat" cmpd="sng" algn="ctr">
+                      <a:solidFill>
+                        <a:schemeClr val="tx1"/>
+                      </a:solidFill>
+                      <a:prstDash val="solid"/>
+                      <a:round/>
+                      <a:headEnd type="none" w="med" len="med"/>
+                      <a:tailEnd type="none" w="med" len="med"/>
+                    </a:lnT>
+                    <a:lnB w="6350" cap="flat" cmpd="sng" algn="ctr">
+                      <a:solidFill>
+                        <a:schemeClr val="tx1"/>
+                      </a:solidFill>
+                      <a:prstDash val="solid"/>
+                      <a:round/>
+                      <a:headEnd type="none" w="med" len="med"/>
+                      <a:tailEnd type="none" w="med" len="med"/>
+                    </a:lnB>
+                    <a:solidFill>
+                      <a:schemeClr val="bg1">
+                        <a:lumMod val="95000"/>
+                      </a:schemeClr>
+                    </a:solidFill>
+                  </a:tcPr>
+                </a:tc>
+                <a:extLst>
+                  <a:ext uri="{0D108BD9-81ED-4DB2-BD59-A6C34878D82A}">
+                    <a16:rowId xmlns:a16="http://schemas.microsoft.com/office/drawing/2014/main" val="1511773425"/>
+                  </a:ext>
+                </a:extLst>
+              </a:tr>
+              <a:tr h="1524495">
+                <a:tc>
+                  <a:txBody>
+                    <a:bodyPr/>
+                    <a:lstStyle/>
+                    <a:p>
+                      <a:pPr algn="ctr"/>
+                      <a:r>
+                        <a:rPr lang="en-US" sz="1200" b="1" dirty="0">
+                          <a:latin typeface="Times New Roman" panose="02020603050405020304" pitchFamily="18" charset="0"/>
+                          <a:cs typeface="Times New Roman" panose="02020603050405020304" pitchFamily="18" charset="0"/>
+                        </a:rPr>
+                        <a:t>3</a:t>
+                      </a:r>
+                    </a:p>
+                  </a:txBody>
+                  <a:tcPr marL="9144" marR="9144" anchor="ctr">
+                    <a:lnL w="6350" cap="flat" cmpd="sng" algn="ctr">
+                      <a:solidFill>
+                        <a:schemeClr val="tx1"/>
+                      </a:solidFill>
+                      <a:prstDash val="solid"/>
+                      <a:round/>
+                      <a:headEnd type="none" w="med" len="med"/>
+                      <a:tailEnd type="none" w="med" len="med"/>
+                    </a:lnL>
+                    <a:lnR w="6350" cap="flat" cmpd="sng" algn="ctr">
+                      <a:solidFill>
+                        <a:schemeClr val="tx1"/>
+                      </a:solidFill>
+                      <a:prstDash val="solid"/>
+                      <a:round/>
+                      <a:headEnd type="none" w="med" len="med"/>
+                      <a:tailEnd type="none" w="med" len="med"/>
+                    </a:lnR>
+                    <a:lnT w="6350" cap="flat" cmpd="sng" algn="ctr">
+                      <a:solidFill>
+                        <a:schemeClr val="tx1"/>
+                      </a:solidFill>
+                      <a:prstDash val="solid"/>
+                      <a:round/>
+                      <a:headEnd type="none" w="med" len="med"/>
+                      <a:tailEnd type="none" w="med" len="med"/>
+                    </a:lnT>
+                    <a:lnB w="6350" cap="flat" cmpd="sng" algn="ctr">
+                      <a:solidFill>
+                        <a:schemeClr val="tx1"/>
+                      </a:solidFill>
+                      <a:prstDash val="solid"/>
+                      <a:round/>
+                      <a:headEnd type="none" w="med" len="med"/>
+                      <a:tailEnd type="none" w="med" len="med"/>
+                    </a:lnB>
+                    <a:solidFill>
+                      <a:schemeClr val="bg1">
+                        <a:lumMod val="95000"/>
+                      </a:schemeClr>
+                    </a:solidFill>
+                  </a:tcPr>
+                </a:tc>
+                <a:extLst>
+                  <a:ext uri="{0D108BD9-81ED-4DB2-BD59-A6C34878D82A}">
+                    <a16:rowId xmlns:a16="http://schemas.microsoft.com/office/drawing/2014/main" val="1362896119"/>
+                  </a:ext>
+                </a:extLst>
+              </a:tr>
+              <a:tr h="1524495">
+                <a:tc>
+                  <a:txBody>
+                    <a:bodyPr/>
+                    <a:lstStyle/>
+                    <a:p>
+                      <a:pPr algn="ctr"/>
+                      <a:r>
+                        <a:rPr lang="en-US" sz="1200" b="1" dirty="0">
+                          <a:latin typeface="Times New Roman" panose="02020603050405020304" pitchFamily="18" charset="0"/>
+                          <a:cs typeface="Times New Roman" panose="02020603050405020304" pitchFamily="18" charset="0"/>
+                        </a:rPr>
+                        <a:t>4</a:t>
+                      </a:r>
+                    </a:p>
+                  </a:txBody>
+                  <a:tcPr marL="9144" marR="9144" anchor="ctr">
+                    <a:lnL w="6350" cap="flat" cmpd="sng" algn="ctr">
+                      <a:solidFill>
+                        <a:schemeClr val="tx1"/>
+                      </a:solidFill>
+                      <a:prstDash val="solid"/>
+                      <a:round/>
+                      <a:headEnd type="none" w="med" len="med"/>
+                      <a:tailEnd type="none" w="med" len="med"/>
+                    </a:lnL>
+                    <a:lnR w="6350" cap="flat" cmpd="sng" algn="ctr">
+                      <a:solidFill>
+                        <a:schemeClr val="tx1"/>
+                      </a:solidFill>
+                      <a:prstDash val="solid"/>
+                      <a:round/>
+                      <a:headEnd type="none" w="med" len="med"/>
+                      <a:tailEnd type="none" w="med" len="med"/>
+                    </a:lnR>
+                    <a:lnT w="6350" cap="flat" cmpd="sng" algn="ctr">
+                      <a:solidFill>
+                        <a:schemeClr val="tx1"/>
+                      </a:solidFill>
+                      <a:prstDash val="solid"/>
+                      <a:round/>
+                      <a:headEnd type="none" w="med" len="med"/>
+                      <a:tailEnd type="none" w="med" len="med"/>
+                    </a:lnT>
+                    <a:lnB w="6350" cap="flat" cmpd="sng" algn="ctr">
+                      <a:solidFill>
+                        <a:schemeClr val="tx1"/>
+                      </a:solidFill>
+                      <a:prstDash val="solid"/>
+                      <a:round/>
+                      <a:headEnd type="none" w="med" len="med"/>
+                      <a:tailEnd type="none" w="med" len="med"/>
+                    </a:lnB>
+                    <a:solidFill>
+                      <a:schemeClr val="bg1">
+                        <a:lumMod val="95000"/>
+                      </a:schemeClr>
+                    </a:solidFill>
+                  </a:tcPr>
+                </a:tc>
+                <a:extLst>
+                  <a:ext uri="{0D108BD9-81ED-4DB2-BD59-A6C34878D82A}">
+                    <a16:rowId xmlns:a16="http://schemas.microsoft.com/office/drawing/2014/main" val="712826966"/>
+                  </a:ext>
+                </a:extLst>
+              </a:tr>
+            </a:tbl>
+          </a:graphicData>
+        </a:graphic>
+      </p:graphicFrame>
+      <p:graphicFrame>
+        <p:nvGraphicFramePr>
+          <p:cNvPr id="30" name="Table 29">
+            <a:extLst>
+              <a:ext uri="{FF2B5EF4-FFF2-40B4-BE49-F238E27FC236}">
+                <a16:creationId xmlns:a16="http://schemas.microsoft.com/office/drawing/2014/main" id="{31A258DA-9928-2D4F-B730-EB61AA3072CE}"/>
+              </a:ext>
+            </a:extLst>
+          </p:cNvPr>
+          <p:cNvGraphicFramePr>
+            <a:graphicFrameLocks noGrp="1"/>
+          </p:cNvGraphicFramePr>
+          <p:nvPr>
+            <p:extLst>
+              <p:ext uri="{D42A27DB-BD31-4B8C-83A1-F6EECF244321}">
+                <p14:modId xmlns:p14="http://schemas.microsoft.com/office/powerpoint/2010/main" val="3941564037"/>
+              </p:ext>
+            </p:extLst>
+          </p:nvPr>
+        </p:nvGraphicFramePr>
+        <p:xfrm>
+          <a:off x="4789577" y="1364688"/>
+          <a:ext cx="132588" cy="6097980"/>
+        </p:xfrm>
+        <a:graphic>
+          <a:graphicData uri="http://schemas.openxmlformats.org/drawingml/2006/table">
+            <a:tbl>
+              <a:tblPr firstRow="1" bandRow="1">
+                <a:tableStyleId>{5940675A-B579-460E-94D1-54222C63F5DA}</a:tableStyleId>
+              </a:tblPr>
+              <a:tblGrid>
+                <a:gridCol w="132588">
+                  <a:extLst>
+                    <a:ext uri="{9D8B030D-6E8A-4147-A177-3AD203B41FA5}">
+                      <a16:colId xmlns:a16="http://schemas.microsoft.com/office/drawing/2014/main" val="3147524444"/>
+                    </a:ext>
+                  </a:extLst>
+                </a:gridCol>
+              </a:tblGrid>
+              <a:tr h="1524495">
+                <a:tc>
+                  <a:txBody>
+                    <a:bodyPr/>
+                    <a:lstStyle/>
+                    <a:p>
+                      <a:pPr algn="ctr"/>
+                      <a:r>
+                        <a:rPr lang="en-US" sz="1200" b="1" dirty="0">
+                          <a:latin typeface="Times New Roman" panose="02020603050405020304" pitchFamily="18" charset="0"/>
+                          <a:cs typeface="Times New Roman" panose="02020603050405020304" pitchFamily="18" charset="0"/>
+                        </a:rPr>
+                        <a:t>5</a:t>
+                      </a:r>
+                    </a:p>
+                  </a:txBody>
+                  <a:tcPr marL="9144" marR="9144" anchor="ctr">
+                    <a:lnL w="6350" cap="flat" cmpd="sng" algn="ctr">
+                      <a:solidFill>
+                        <a:schemeClr val="tx1"/>
+                      </a:solidFill>
+                      <a:prstDash val="solid"/>
+                      <a:round/>
+                      <a:headEnd type="none" w="med" len="med"/>
+                      <a:tailEnd type="none" w="med" len="med"/>
+                    </a:lnL>
+                    <a:lnR w="6350" cap="flat" cmpd="sng" algn="ctr">
+                      <a:solidFill>
+                        <a:schemeClr val="tx1"/>
+                      </a:solidFill>
+                      <a:prstDash val="solid"/>
+                      <a:round/>
+                      <a:headEnd type="none" w="med" len="med"/>
+                      <a:tailEnd type="none" w="med" len="med"/>
+                    </a:lnR>
+                    <a:lnT w="6350" cap="flat" cmpd="sng" algn="ctr">
+                      <a:solidFill>
+                        <a:schemeClr val="tx1"/>
+                      </a:solidFill>
+                      <a:prstDash val="solid"/>
+                      <a:round/>
+                      <a:headEnd type="none" w="med" len="med"/>
+                      <a:tailEnd type="none" w="med" len="med"/>
+                    </a:lnT>
+                    <a:lnB w="6350" cap="flat" cmpd="sng" algn="ctr">
+                      <a:solidFill>
+                        <a:schemeClr val="tx1"/>
+                      </a:solidFill>
+                      <a:prstDash val="solid"/>
+                      <a:round/>
+                      <a:headEnd type="none" w="med" len="med"/>
+                      <a:tailEnd type="none" w="med" len="med"/>
+                    </a:lnB>
+                    <a:solidFill>
+                      <a:schemeClr val="bg1">
+                        <a:lumMod val="95000"/>
+                      </a:schemeClr>
+                    </a:solidFill>
+                  </a:tcPr>
+                </a:tc>
+                <a:extLst>
+                  <a:ext uri="{0D108BD9-81ED-4DB2-BD59-A6C34878D82A}">
+                    <a16:rowId xmlns:a16="http://schemas.microsoft.com/office/drawing/2014/main" val="540773323"/>
+                  </a:ext>
+                </a:extLst>
+              </a:tr>
+              <a:tr h="1524495">
+                <a:tc>
+                  <a:txBody>
+                    <a:bodyPr/>
+                    <a:lstStyle/>
+                    <a:p>
+                      <a:pPr algn="ctr"/>
+                      <a:r>
+                        <a:rPr lang="en-US" sz="1200" b="1" dirty="0">
+                          <a:latin typeface="Times New Roman" panose="02020603050405020304" pitchFamily="18" charset="0"/>
+                          <a:cs typeface="Times New Roman" panose="02020603050405020304" pitchFamily="18" charset="0"/>
+                        </a:rPr>
+                        <a:t>6</a:t>
+                      </a:r>
+                    </a:p>
+                  </a:txBody>
+                  <a:tcPr marL="9144" marR="9144" anchor="ctr">
+                    <a:lnL w="6350" cap="flat" cmpd="sng" algn="ctr">
+                      <a:solidFill>
+                        <a:schemeClr val="tx1"/>
+                      </a:solidFill>
+                      <a:prstDash val="solid"/>
+                      <a:round/>
+                      <a:headEnd type="none" w="med" len="med"/>
+                      <a:tailEnd type="none" w="med" len="med"/>
+                    </a:lnL>
+                    <a:lnR w="6350" cap="flat" cmpd="sng" algn="ctr">
+                      <a:solidFill>
+                        <a:schemeClr val="tx1"/>
+                      </a:solidFill>
+                      <a:prstDash val="solid"/>
+                      <a:round/>
+                      <a:headEnd type="none" w="med" len="med"/>
+                      <a:tailEnd type="none" w="med" len="med"/>
+                    </a:lnR>
+                    <a:lnT w="6350" cap="flat" cmpd="sng" algn="ctr">
+                      <a:solidFill>
+                        <a:schemeClr val="tx1"/>
+                      </a:solidFill>
+                      <a:prstDash val="solid"/>
+                      <a:round/>
+                      <a:headEnd type="none" w="med" len="med"/>
+                      <a:tailEnd type="none" w="med" len="med"/>
+                    </a:lnT>
+                    <a:lnB w="6350" cap="flat" cmpd="sng" algn="ctr">
+                      <a:solidFill>
+                        <a:schemeClr val="tx1"/>
+                      </a:solidFill>
+                      <a:prstDash val="solid"/>
+                      <a:round/>
+                      <a:headEnd type="none" w="med" len="med"/>
+                      <a:tailEnd type="none" w="med" len="med"/>
+                    </a:lnB>
+                    <a:solidFill>
+                      <a:schemeClr val="bg1">
+                        <a:lumMod val="95000"/>
+                      </a:schemeClr>
+                    </a:solidFill>
+                  </a:tcPr>
+                </a:tc>
+                <a:extLst>
+                  <a:ext uri="{0D108BD9-81ED-4DB2-BD59-A6C34878D82A}">
+                    <a16:rowId xmlns:a16="http://schemas.microsoft.com/office/drawing/2014/main" val="1511773425"/>
+                  </a:ext>
+                </a:extLst>
+              </a:tr>
+              <a:tr h="1524495">
+                <a:tc>
+                  <a:txBody>
+                    <a:bodyPr/>
+                    <a:lstStyle/>
+                    <a:p>
+                      <a:pPr algn="ctr"/>
+                      <a:r>
+                        <a:rPr lang="en-US" sz="1200" b="1" dirty="0">
+                          <a:latin typeface="Times New Roman" panose="02020603050405020304" pitchFamily="18" charset="0"/>
+                          <a:cs typeface="Times New Roman" panose="02020603050405020304" pitchFamily="18" charset="0"/>
+                        </a:rPr>
+                        <a:t>7</a:t>
+                      </a:r>
+                    </a:p>
+                  </a:txBody>
+                  <a:tcPr marL="9144" marR="9144" anchor="ctr">
+                    <a:lnL w="6350" cap="flat" cmpd="sng" algn="ctr">
+                      <a:solidFill>
+                        <a:schemeClr val="tx1"/>
+                      </a:solidFill>
+                      <a:prstDash val="solid"/>
+                      <a:round/>
+                      <a:headEnd type="none" w="med" len="med"/>
+                      <a:tailEnd type="none" w="med" len="med"/>
+                    </a:lnL>
+                    <a:lnR w="6350" cap="flat" cmpd="sng" algn="ctr">
+                      <a:solidFill>
+                        <a:schemeClr val="tx1"/>
+                      </a:solidFill>
+                      <a:prstDash val="solid"/>
+                      <a:round/>
+                      <a:headEnd type="none" w="med" len="med"/>
+                      <a:tailEnd type="none" w="med" len="med"/>
+                    </a:lnR>
+                    <a:lnT w="6350" cap="flat" cmpd="sng" algn="ctr">
+                      <a:solidFill>
+                        <a:schemeClr val="tx1"/>
+                      </a:solidFill>
+                      <a:prstDash val="solid"/>
+                      <a:round/>
+                      <a:headEnd type="none" w="med" len="med"/>
+                      <a:tailEnd type="none" w="med" len="med"/>
+                    </a:lnT>
+                    <a:lnB w="6350" cap="flat" cmpd="sng" algn="ctr">
+                      <a:solidFill>
+                        <a:schemeClr val="tx1"/>
+                      </a:solidFill>
+                      <a:prstDash val="solid"/>
+                      <a:round/>
+                      <a:headEnd type="none" w="med" len="med"/>
+                      <a:tailEnd type="none" w="med" len="med"/>
+                    </a:lnB>
+                    <a:solidFill>
+                      <a:schemeClr val="bg1">
+                        <a:lumMod val="95000"/>
+                      </a:schemeClr>
+                    </a:solidFill>
+                  </a:tcPr>
+                </a:tc>
+                <a:extLst>
+                  <a:ext uri="{0D108BD9-81ED-4DB2-BD59-A6C34878D82A}">
+                    <a16:rowId xmlns:a16="http://schemas.microsoft.com/office/drawing/2014/main" val="1362896119"/>
+                  </a:ext>
+                </a:extLst>
+              </a:tr>
+              <a:tr h="1524495">
+                <a:tc>
+                  <a:txBody>
+                    <a:bodyPr/>
+                    <a:lstStyle/>
+                    <a:p>
+                      <a:pPr algn="ctr"/>
+                      <a:r>
+                        <a:rPr lang="en-US" sz="1200" b="1" dirty="0">
+                          <a:latin typeface="Times New Roman" panose="02020603050405020304" pitchFamily="18" charset="0"/>
+                          <a:cs typeface="Times New Roman" panose="02020603050405020304" pitchFamily="18" charset="0"/>
+                        </a:rPr>
+                        <a:t>8</a:t>
+                      </a:r>
+                    </a:p>
+                  </a:txBody>
+                  <a:tcPr marL="9144" marR="9144" anchor="ctr">
+                    <a:lnL w="6350" cap="flat" cmpd="sng" algn="ctr">
+                      <a:solidFill>
+                        <a:schemeClr val="tx1"/>
+                      </a:solidFill>
+                      <a:prstDash val="solid"/>
+                      <a:round/>
+                      <a:headEnd type="none" w="med" len="med"/>
+                      <a:tailEnd type="none" w="med" len="med"/>
+                    </a:lnL>
+                    <a:lnR w="6350" cap="flat" cmpd="sng" algn="ctr">
+                      <a:solidFill>
+                        <a:schemeClr val="tx1"/>
+                      </a:solidFill>
+                      <a:prstDash val="solid"/>
+                      <a:round/>
+                      <a:headEnd type="none" w="med" len="med"/>
+                      <a:tailEnd type="none" w="med" len="med"/>
+                    </a:lnR>
+                    <a:lnT w="6350" cap="flat" cmpd="sng" algn="ctr">
+                      <a:solidFill>
+                        <a:schemeClr val="tx1"/>
+                      </a:solidFill>
+                      <a:prstDash val="solid"/>
+                      <a:round/>
+                      <a:headEnd type="none" w="med" len="med"/>
+                      <a:tailEnd type="none" w="med" len="med"/>
+                    </a:lnT>
+                    <a:lnB w="6350" cap="flat" cmpd="sng" algn="ctr">
+                      <a:solidFill>
+                        <a:schemeClr val="tx1"/>
+                      </a:solidFill>
+                      <a:prstDash val="solid"/>
+                      <a:round/>
+                      <a:headEnd type="none" w="med" len="med"/>
+                      <a:tailEnd type="none" w="med" len="med"/>
+                    </a:lnB>
+                    <a:solidFill>
+                      <a:schemeClr val="bg1">
+                        <a:lumMod val="95000"/>
+                      </a:schemeClr>
+                    </a:solidFill>
+                  </a:tcPr>
+                </a:tc>
+                <a:extLst>
+                  <a:ext uri="{0D108BD9-81ED-4DB2-BD59-A6C34878D82A}">
+                    <a16:rowId xmlns:a16="http://schemas.microsoft.com/office/drawing/2014/main" val="712826966"/>
+                  </a:ext>
+                </a:extLst>
+              </a:tr>
+            </a:tbl>
+          </a:graphicData>
+        </a:graphic>
+      </p:graphicFrame>
+      <p:graphicFrame>
+        <p:nvGraphicFramePr>
+          <p:cNvPr id="66" name="Table 65">
+            <a:extLst>
+              <a:ext uri="{FF2B5EF4-FFF2-40B4-BE49-F238E27FC236}">
+                <a16:creationId xmlns:a16="http://schemas.microsoft.com/office/drawing/2014/main" id="{F9E8E0C4-0D0F-716B-7E3B-3F43DEFA8E21}"/>
+              </a:ext>
+            </a:extLst>
+          </p:cNvPr>
+          <p:cNvGraphicFramePr>
+            <a:graphicFrameLocks noGrp="1"/>
+          </p:cNvGraphicFramePr>
+          <p:nvPr>
+            <p:extLst>
+              <p:ext uri="{D42A27DB-BD31-4B8C-83A1-F6EECF244321}">
+                <p14:modId xmlns:p14="http://schemas.microsoft.com/office/powerpoint/2010/main" val="230359976"/>
+              </p:ext>
+            </p:extLst>
+          </p:nvPr>
+        </p:nvGraphicFramePr>
+        <p:xfrm>
+          <a:off x="75973" y="1159682"/>
+          <a:ext cx="9427440" cy="201168"/>
+        </p:xfrm>
+        <a:graphic>
+          <a:graphicData uri="http://schemas.openxmlformats.org/drawingml/2006/table">
+            <a:tbl>
+              <a:tblPr firstRow="1" bandRow="1">
+                <a:tableStyleId>{5940675A-B579-460E-94D1-54222C63F5DA}</a:tableStyleId>
+              </a:tblPr>
+              <a:tblGrid>
+                <a:gridCol w="131990">
+                  <a:extLst>
+                    <a:ext uri="{9D8B030D-6E8A-4147-A177-3AD203B41FA5}">
+                      <a16:colId xmlns:a16="http://schemas.microsoft.com/office/drawing/2014/main" val="1013412612"/>
+                    </a:ext>
+                  </a:extLst>
+                </a:gridCol>
+                <a:gridCol w="3063875">
+                  <a:extLst>
+                    <a:ext uri="{9D8B030D-6E8A-4147-A177-3AD203B41FA5}">
+                      <a16:colId xmlns:a16="http://schemas.microsoft.com/office/drawing/2014/main" val="755691921"/>
+                    </a:ext>
+                  </a:extLst>
+                </a:gridCol>
+                <a:gridCol w="1516062">
+                  <a:extLst>
+                    <a:ext uri="{9D8B030D-6E8A-4147-A177-3AD203B41FA5}">
+                      <a16:colId xmlns:a16="http://schemas.microsoft.com/office/drawing/2014/main" val="1219837517"/>
+                    </a:ext>
+                  </a:extLst>
+                </a:gridCol>
+                <a:gridCol w="136525">
+                  <a:extLst>
+                    <a:ext uri="{9D8B030D-6E8A-4147-A177-3AD203B41FA5}">
+                      <a16:colId xmlns:a16="http://schemas.microsoft.com/office/drawing/2014/main" val="2123945036"/>
+                    </a:ext>
+                  </a:extLst>
+                </a:gridCol>
+                <a:gridCol w="3054350">
+                  <a:extLst>
+                    <a:ext uri="{9D8B030D-6E8A-4147-A177-3AD203B41FA5}">
+                      <a16:colId xmlns:a16="http://schemas.microsoft.com/office/drawing/2014/main" val="4138351482"/>
+                    </a:ext>
+                  </a:extLst>
+                </a:gridCol>
+                <a:gridCol w="1524638">
+                  <a:extLst>
+                    <a:ext uri="{9D8B030D-6E8A-4147-A177-3AD203B41FA5}">
+                      <a16:colId xmlns:a16="http://schemas.microsoft.com/office/drawing/2014/main" val="956388742"/>
+                    </a:ext>
+                  </a:extLst>
+                </a:gridCol>
+              </a:tblGrid>
+              <a:tr h="191752">
+                <a:tc>
+                  <a:txBody>
+                    <a:bodyPr/>
+                    <a:lstStyle/>
+                    <a:p>
+                      <a:pPr algn="ctr"/>
+                      <a:r>
+                        <a:rPr lang="en-US" sz="600" b="1" dirty="0">
+                          <a:latin typeface="Times New Roman" panose="02020603050405020304" pitchFamily="18" charset="0"/>
+                          <a:cs typeface="Times New Roman" panose="02020603050405020304" pitchFamily="18" charset="0"/>
+                        </a:rPr>
+                        <a:t>Nr.</a:t>
+                      </a:r>
+                    </a:p>
+                  </a:txBody>
+                  <a:tcPr marL="9144" marR="9144" marT="9144" marB="9144" anchor="ctr">
+                    <a:lnL w="6350" cap="flat" cmpd="sng" algn="ctr">
+                      <a:solidFill>
+                        <a:schemeClr val="tx1"/>
+                      </a:solidFill>
+                      <a:prstDash val="solid"/>
+                      <a:round/>
+                      <a:headEnd type="none" w="med" len="med"/>
+                      <a:tailEnd type="none" w="med" len="med"/>
+                    </a:lnL>
+                    <a:lnR w="6350" cap="flat" cmpd="sng" algn="ctr">
+                      <a:solidFill>
+                        <a:schemeClr val="tx1"/>
+                      </a:solidFill>
+                      <a:prstDash val="solid"/>
+                      <a:round/>
+                      <a:headEnd type="none" w="med" len="med"/>
+                      <a:tailEnd type="none" w="med" len="med"/>
+                    </a:lnR>
+                    <a:lnT w="6350" cap="flat" cmpd="sng" algn="ctr">
+                      <a:solidFill>
+                        <a:schemeClr val="tx1"/>
+                      </a:solidFill>
+                      <a:prstDash val="solid"/>
+                      <a:round/>
+                      <a:headEnd type="none" w="med" len="med"/>
+                      <a:tailEnd type="none" w="med" len="med"/>
+                    </a:lnT>
+                    <a:lnB w="6350" cap="flat" cmpd="sng" algn="ctr">
+                      <a:solidFill>
+                        <a:schemeClr val="tx1"/>
+                      </a:solidFill>
+                      <a:prstDash val="solid"/>
+                      <a:round/>
+                      <a:headEnd type="none" w="med" len="med"/>
+                      <a:tailEnd type="none" w="med" len="med"/>
+                    </a:lnB>
+                    <a:solidFill>
+                      <a:srgbClr val="F2F2F2"/>
+                    </a:solidFill>
+                  </a:tcPr>
+                </a:tc>
+                <a:tc>
+                  <a:txBody>
+                    <a:bodyPr/>
+                    <a:lstStyle/>
+                    <a:p>
+                      <a:pPr algn="ctr"/>
+                      <a:r>
+                        <a:rPr lang="en-US" sz="1200" dirty="0">
+                          <a:latin typeface="Times New Roman" panose="02020603050405020304" pitchFamily="18" charset="0"/>
+                          <a:cs typeface="Times New Roman" panose="02020603050405020304" pitchFamily="18" charset="0"/>
+                        </a:rPr>
+                        <a:t>Pareto front solutions</a:t>
+                      </a:r>
+                    </a:p>
+                  </a:txBody>
+                  <a:tcPr marL="9144" marR="9144" marT="9144" marB="9144" anchor="ctr">
+                    <a:lnL w="6350" cap="flat" cmpd="sng" algn="ctr">
+                      <a:solidFill>
+                        <a:schemeClr val="tx1"/>
+                      </a:solidFill>
+                      <a:prstDash val="solid"/>
+                      <a:round/>
+                      <a:headEnd type="none" w="med" len="med"/>
+                      <a:tailEnd type="none" w="med" len="med"/>
+                    </a:lnL>
+                    <a:lnR w="6350" cap="flat" cmpd="sng" algn="ctr">
+                      <a:solidFill>
+                        <a:schemeClr val="tx1"/>
+                      </a:solidFill>
+                      <a:prstDash val="solid"/>
+                      <a:round/>
+                      <a:headEnd type="none" w="med" len="med"/>
+                      <a:tailEnd type="none" w="med" len="med"/>
+                    </a:lnR>
+                    <a:lnT w="6350" cap="flat" cmpd="sng" algn="ctr">
+                      <a:solidFill>
+                        <a:schemeClr val="tx1"/>
+                      </a:solidFill>
+                      <a:prstDash val="solid"/>
+                      <a:round/>
+                      <a:headEnd type="none" w="med" len="med"/>
+                      <a:tailEnd type="none" w="med" len="med"/>
+                    </a:lnT>
+                    <a:lnB w="6350" cap="flat" cmpd="sng" algn="ctr">
+                      <a:solidFill>
+                        <a:schemeClr val="tx1"/>
+                      </a:solidFill>
+                      <a:prstDash val="solid"/>
+                      <a:round/>
+                      <a:headEnd type="none" w="med" len="med"/>
+                      <a:tailEnd type="none" w="med" len="med"/>
+                    </a:lnB>
+                    <a:solidFill>
+                      <a:srgbClr val="A6CAEC"/>
+                    </a:solidFill>
+                  </a:tcPr>
+                </a:tc>
+                <a:tc>
+                  <a:txBody>
+                    <a:bodyPr/>
+                    <a:lstStyle/>
+                    <a:p>
+                      <a:pPr algn="ctr"/>
+                      <a:r>
+                        <a:rPr lang="en-US" sz="1200" dirty="0">
+                          <a:latin typeface="Times New Roman" panose="02020603050405020304" pitchFamily="18" charset="0"/>
+                          <a:cs typeface="Times New Roman" panose="02020603050405020304" pitchFamily="18" charset="0"/>
+                        </a:rPr>
+                        <a:t>Others</a:t>
+                      </a:r>
+                    </a:p>
+                  </a:txBody>
+                  <a:tcPr marL="9144" marR="9144" marT="9144" marB="9144" anchor="ctr">
+                    <a:lnL w="6350" cap="flat" cmpd="sng" algn="ctr">
+                      <a:solidFill>
+                        <a:schemeClr val="tx1"/>
+                      </a:solidFill>
+                      <a:prstDash val="solid"/>
+                      <a:round/>
+                      <a:headEnd type="none" w="med" len="med"/>
+                      <a:tailEnd type="none" w="med" len="med"/>
+                    </a:lnL>
+                    <a:lnR w="6350" cap="flat" cmpd="sng" algn="ctr">
+                      <a:solidFill>
+                        <a:schemeClr val="tx1"/>
+                      </a:solidFill>
+                      <a:prstDash val="solid"/>
+                      <a:round/>
+                      <a:headEnd type="none" w="med" len="med"/>
+                      <a:tailEnd type="none" w="med" len="med"/>
+                    </a:lnR>
+                    <a:lnT w="6350" cap="flat" cmpd="sng" algn="ctr">
+                      <a:solidFill>
+                        <a:schemeClr val="tx1"/>
+                      </a:solidFill>
+                      <a:prstDash val="solid"/>
+                      <a:round/>
+                      <a:headEnd type="none" w="med" len="med"/>
+                      <a:tailEnd type="none" w="med" len="med"/>
+                    </a:lnT>
+                    <a:lnB w="6350" cap="flat" cmpd="sng" algn="ctr">
+                      <a:solidFill>
+                        <a:schemeClr val="tx1"/>
+                      </a:solidFill>
+                      <a:prstDash val="solid"/>
+                      <a:round/>
+                      <a:headEnd type="none" w="med" len="med"/>
+                      <a:tailEnd type="none" w="med" len="med"/>
+                    </a:lnB>
+                    <a:solidFill>
+                      <a:srgbClr val="D9D9D9"/>
+                    </a:solidFill>
+                  </a:tcPr>
+                </a:tc>
+                <a:tc>
+                  <a:txBody>
+                    <a:bodyPr/>
+                    <a:lstStyle/>
+                    <a:p>
+                      <a:pPr marL="0" marR="0" lvl="0" indent="0" algn="ctr" defTabSz="960120" rtl="0" eaLnBrk="1" fontAlgn="auto" latinLnBrk="0" hangingPunct="1">
+                        <a:lnSpc>
+                          <a:spcPct val="100000"/>
+                        </a:lnSpc>
+                        <a:spcBef>
+                          <a:spcPts val="0"/>
+                        </a:spcBef>
+                        <a:spcAft>
+                          <a:spcPts val="0"/>
+                        </a:spcAft>
+                        <a:buClrTx/>
+                        <a:buSzTx/>
+                        <a:buFontTx/>
+                        <a:buNone/>
+                        <a:tabLst/>
+                        <a:defRPr/>
+                      </a:pPr>
+                      <a:r>
+                        <a:rPr kumimoji="0" lang="en-US" sz="600" b="1" i="0" u="none" strike="noStrike" kern="1200" cap="none" spc="0" normalizeH="0" baseline="0" noProof="0" dirty="0">
+                          <a:ln>
+                            <a:noFill/>
+                          </a:ln>
+                          <a:solidFill>
+                            <a:prstClr val="black"/>
+                          </a:solidFill>
+                          <a:effectLst/>
+                          <a:uLnTx/>
+                          <a:uFillTx/>
+                          <a:latin typeface="Times New Roman" panose="02020603050405020304" pitchFamily="18" charset="0"/>
+                          <a:ea typeface="+mn-ea"/>
+                          <a:cs typeface="Times New Roman" panose="02020603050405020304" pitchFamily="18" charset="0"/>
+                        </a:rPr>
+                        <a:t>Nr.</a:t>
+                      </a:r>
+                    </a:p>
+                  </a:txBody>
+                  <a:tcPr marL="9144" marR="9144" marT="9144" marB="9144" anchor="ctr">
+                    <a:lnL w="6350" cap="flat" cmpd="sng" algn="ctr">
+                      <a:solidFill>
+                        <a:schemeClr val="tx1"/>
+                      </a:solidFill>
+                      <a:prstDash val="solid"/>
+                      <a:round/>
+                      <a:headEnd type="none" w="med" len="med"/>
+                      <a:tailEnd type="none" w="med" len="med"/>
+                    </a:lnL>
+                    <a:lnR w="6350" cap="flat" cmpd="sng" algn="ctr">
+                      <a:solidFill>
+                        <a:schemeClr val="tx1"/>
+                      </a:solidFill>
+                      <a:prstDash val="solid"/>
+                      <a:round/>
+                      <a:headEnd type="none" w="med" len="med"/>
+                      <a:tailEnd type="none" w="med" len="med"/>
+                    </a:lnR>
+                    <a:lnT w="6350" cap="flat" cmpd="sng" algn="ctr">
+                      <a:solidFill>
+                        <a:schemeClr val="tx1"/>
+                      </a:solidFill>
+                      <a:prstDash val="solid"/>
+                      <a:round/>
+                      <a:headEnd type="none" w="med" len="med"/>
+                      <a:tailEnd type="none" w="med" len="med"/>
+                    </a:lnT>
+                    <a:lnB w="6350" cap="flat" cmpd="sng" algn="ctr">
+                      <a:solidFill>
+                        <a:schemeClr val="tx1"/>
+                      </a:solidFill>
+                      <a:prstDash val="solid"/>
+                      <a:round/>
+                      <a:headEnd type="none" w="med" len="med"/>
+                      <a:tailEnd type="none" w="med" len="med"/>
+                    </a:lnB>
+                    <a:solidFill>
+                      <a:srgbClr val="F2F2F2"/>
+                    </a:solidFill>
+                  </a:tcPr>
+                </a:tc>
+                <a:tc>
+                  <a:txBody>
+                    <a:bodyPr/>
+                    <a:lstStyle/>
+                    <a:p>
+                      <a:pPr algn="ctr"/>
+                      <a:r>
+                        <a:rPr lang="en-US" sz="1200" dirty="0">
+                          <a:latin typeface="Times New Roman" panose="02020603050405020304" pitchFamily="18" charset="0"/>
+                          <a:cs typeface="Times New Roman" panose="02020603050405020304" pitchFamily="18" charset="0"/>
+                        </a:rPr>
+                        <a:t>Pareto front solutions</a:t>
+                      </a:r>
+                    </a:p>
+                  </a:txBody>
+                  <a:tcPr marL="9144" marR="9144" marT="9144" marB="9144" anchor="ctr">
+                    <a:lnL w="6350" cap="flat" cmpd="sng" algn="ctr">
+                      <a:solidFill>
+                        <a:schemeClr val="tx1"/>
+                      </a:solidFill>
+                      <a:prstDash val="solid"/>
+                      <a:round/>
+                      <a:headEnd type="none" w="med" len="med"/>
+                      <a:tailEnd type="none" w="med" len="med"/>
+                    </a:lnL>
+                    <a:lnR w="6350" cap="flat" cmpd="sng" algn="ctr">
+                      <a:solidFill>
+                        <a:schemeClr val="tx1"/>
+                      </a:solidFill>
+                      <a:prstDash val="solid"/>
+                      <a:round/>
+                      <a:headEnd type="none" w="med" len="med"/>
+                      <a:tailEnd type="none" w="med" len="med"/>
+                    </a:lnR>
+                    <a:lnT w="6350" cap="flat" cmpd="sng" algn="ctr">
+                      <a:solidFill>
+                        <a:schemeClr val="tx1"/>
+                      </a:solidFill>
+                      <a:prstDash val="solid"/>
+                      <a:round/>
+                      <a:headEnd type="none" w="med" len="med"/>
+                      <a:tailEnd type="none" w="med" len="med"/>
+                    </a:lnT>
+                    <a:lnB w="6350" cap="flat" cmpd="sng" algn="ctr">
+                      <a:solidFill>
+                        <a:schemeClr val="tx1"/>
+                      </a:solidFill>
+                      <a:prstDash val="solid"/>
+                      <a:round/>
+                      <a:headEnd type="none" w="med" len="med"/>
+                      <a:tailEnd type="none" w="med" len="med"/>
+                    </a:lnB>
+                    <a:solidFill>
+                      <a:srgbClr val="A6CAEC"/>
+                    </a:solidFill>
+                  </a:tcPr>
+                </a:tc>
+                <a:tc>
+                  <a:txBody>
+                    <a:bodyPr/>
+                    <a:lstStyle/>
+                    <a:p>
+                      <a:pPr algn="ctr"/>
+                      <a:r>
+                        <a:rPr lang="en-US" sz="1200" dirty="0">
+                          <a:latin typeface="Times New Roman" panose="02020603050405020304" pitchFamily="18" charset="0"/>
+                          <a:cs typeface="Times New Roman" panose="02020603050405020304" pitchFamily="18" charset="0"/>
+                        </a:rPr>
+                        <a:t>Others</a:t>
+                      </a:r>
+                    </a:p>
+                  </a:txBody>
+                  <a:tcPr marL="9144" marR="9144" marT="9144" marB="9144" anchor="ctr">
+                    <a:lnL w="6350" cap="flat" cmpd="sng" algn="ctr">
+                      <a:solidFill>
+                        <a:schemeClr val="tx1"/>
+                      </a:solidFill>
+                      <a:prstDash val="solid"/>
+                      <a:round/>
+                      <a:headEnd type="none" w="med" len="med"/>
+                      <a:tailEnd type="none" w="med" len="med"/>
+                    </a:lnL>
+                    <a:lnR w="6350" cap="flat" cmpd="sng" algn="ctr">
+                      <a:solidFill>
+                        <a:schemeClr val="tx1"/>
+                      </a:solidFill>
+                      <a:prstDash val="solid"/>
+                      <a:round/>
+                      <a:headEnd type="none" w="med" len="med"/>
+                      <a:tailEnd type="none" w="med" len="med"/>
+                    </a:lnR>
+                    <a:lnT w="6350" cap="flat" cmpd="sng" algn="ctr">
+                      <a:solidFill>
+                        <a:schemeClr val="tx1"/>
+                      </a:solidFill>
+                      <a:prstDash val="solid"/>
+                      <a:round/>
+                      <a:headEnd type="none" w="med" len="med"/>
+                      <a:tailEnd type="none" w="med" len="med"/>
+                    </a:lnT>
+                    <a:lnB w="6350" cap="flat" cmpd="sng" algn="ctr">
+                      <a:solidFill>
+                        <a:schemeClr val="tx1"/>
+                      </a:solidFill>
+                      <a:prstDash val="solid"/>
+                      <a:round/>
+                      <a:headEnd type="none" w="med" len="med"/>
+                      <a:tailEnd type="none" w="med" len="med"/>
+                    </a:lnB>
+                    <a:solidFill>
+                      <a:srgbClr val="D9D9D9"/>
+                    </a:solidFill>
+                  </a:tcPr>
+                </a:tc>
+                <a:extLst>
+                  <a:ext uri="{0D108BD9-81ED-4DB2-BD59-A6C34878D82A}">
+                    <a16:rowId xmlns:a16="http://schemas.microsoft.com/office/drawing/2014/main" val="2526126805"/>
+                  </a:ext>
+                </a:extLst>
+              </a:tr>
+            </a:tbl>
+          </a:graphicData>
+        </a:graphic>
+      </p:graphicFrame>
     </p:spTree>
     <p:extLst>
       <p:ext uri="{BB962C8B-B14F-4D97-AF65-F5344CB8AC3E}">

</xml_diff>